<commit_message>
Cleaned up right logo
</commit_message>
<xml_diff>
--- a/vilhuber-sachdev-nizard-2026.pptx
+++ b/vilhuber-sachdev-nizard-2026.pptx
@@ -114,7 +114,20 @@
       </a:defRPr>
     </a:lvl9pPr>
   </p:defaultTextStyle>
+  <p:extLst>
+    <p:ext uri="{EFAFB233-063F-42B5-8137-9DF3F51BA10A}">
+      <p15:sldGuideLst xmlns:p15="http://schemas.microsoft.com/office/powerpoint/2012/main"/>
+    </p:ext>
+  </p:extLst>
 </p:presentation>
+</file>
+
+<file path=ppt/revisionInfo.xml><?xml version="1.0" encoding="utf-8"?>
+<p1510:revInfo xmlns:a="http://schemas.openxmlformats.org/drawingml/2006/main" xmlns:r="http://schemas.openxmlformats.org/officeDocument/2006/relationships" xmlns:p1510="http://schemas.microsoft.com/office/powerpoint/2015/10/main">
+  <p1510:revLst>
+    <p1510:client id="{97024BB9-2D00-9E18-8D0C-E0BB1D058C15}" v="7" dt="2025-12-07T19:05:38.313"/>
+  </p1510:revLst>
+</p1510:revInfo>
 </file>
 
 <file path=ppt/slideLayouts/slideLayout1.xml><?xml version="1.0" encoding="utf-8"?>
@@ -283,6 +296,2785 @@
         </p:txBody>
       </p:sp>
     </p:spTree>
+  </p:cSld>
+  <p:clrMapOvr>
+    <a:masterClrMapping/>
+  </p:clrMapOvr>
+</p:sldLayout>
+</file>
+
+<file path=ppt/slideLayouts/slideLayout10.xml><?xml version="1.0" encoding="utf-8"?>
+<p:sldLayout xmlns:a="http://schemas.openxmlformats.org/drawingml/2006/main" xmlns:r="http://schemas.openxmlformats.org/officeDocument/2006/relationships" xmlns:p="http://schemas.openxmlformats.org/presentationml/2006/main" type="title" preserve="1">
+  <p:cSld name="Title Slide">
+    <p:spTree>
+      <p:nvGrpSpPr>
+        <p:cNvPr id="1" name=""/>
+        <p:cNvGrpSpPr/>
+        <p:nvPr/>
+      </p:nvGrpSpPr>
+      <p:grpSpPr>
+        <a:xfrm>
+          <a:off x="0" y="0"/>
+          <a:ext cx="0" cy="0"/>
+          <a:chOff x="0" y="0"/>
+          <a:chExt cx="0" cy="0"/>
+        </a:xfrm>
+      </p:grpSpPr>
+      <p:sp>
+        <p:nvSpPr>
+          <p:cNvPr id="2" name="Title 1">
+            <a:extLst>
+              <a:ext uri="{FF2B5EF4-FFF2-40B4-BE49-F238E27FC236}">
+                <a16:creationId xmlns:a16="http://schemas.microsoft.com/office/drawing/2014/main" id="{1AFA9A7F-9121-E6D2-83D9-9D7486EC3414}"/>
+              </a:ext>
+            </a:extLst>
+          </p:cNvPr>
+          <p:cNvSpPr>
+            <a:spLocks noGrp="1"/>
+          </p:cNvSpPr>
+          <p:nvPr>
+            <p:ph type="ctrTitle"/>
+          </p:nvPr>
+        </p:nvSpPr>
+        <p:spPr>
+          <a:xfrm>
+            <a:off x="4114800" y="7183438"/>
+            <a:ext cx="24688800" cy="15279687"/>
+          </a:xfrm>
+        </p:spPr>
+        <p:txBody>
+          <a:bodyPr anchor="b"/>
+          <a:lstStyle>
+            <a:lvl1pPr algn="ctr">
+              <a:defRPr sz="6000"/>
+            </a:lvl1pPr>
+          </a:lstStyle>
+          <a:p>
+            <a:r>
+              <a:rPr lang="en-US"/>
+              <a:t>Click to edit Master title style</a:t>
+            </a:r>
+          </a:p>
+        </p:txBody>
+      </p:sp>
+      <p:sp>
+        <p:nvSpPr>
+          <p:cNvPr id="3" name="Subtitle 2">
+            <a:extLst>
+              <a:ext uri="{FF2B5EF4-FFF2-40B4-BE49-F238E27FC236}">
+                <a16:creationId xmlns:a16="http://schemas.microsoft.com/office/drawing/2014/main" id="{0771E3F0-5338-058B-CDBE-FCC266FEC4A4}"/>
+              </a:ext>
+            </a:extLst>
+          </p:cNvPr>
+          <p:cNvSpPr>
+            <a:spLocks noGrp="1"/>
+          </p:cNvSpPr>
+          <p:nvPr>
+            <p:ph type="subTitle" idx="1"/>
+          </p:nvPr>
+        </p:nvSpPr>
+        <p:spPr>
+          <a:xfrm>
+            <a:off x="4114800" y="23053675"/>
+            <a:ext cx="24688800" cy="10596563"/>
+          </a:xfrm>
+        </p:spPr>
+        <p:txBody>
+          <a:bodyPr/>
+          <a:lstStyle>
+            <a:lvl1pPr marL="0" indent="0" algn="ctr">
+              <a:buNone/>
+              <a:defRPr sz="2400"/>
+            </a:lvl1pPr>
+            <a:lvl2pPr marL="457200" indent="0" algn="ctr">
+              <a:buNone/>
+              <a:defRPr sz="2000"/>
+            </a:lvl2pPr>
+            <a:lvl3pPr marL="914400" indent="0" algn="ctr">
+              <a:buNone/>
+              <a:defRPr sz="1800"/>
+            </a:lvl3pPr>
+            <a:lvl4pPr marL="1371600" indent="0" algn="ctr">
+              <a:buNone/>
+              <a:defRPr sz="1600"/>
+            </a:lvl4pPr>
+            <a:lvl5pPr marL="1828800" indent="0" algn="ctr">
+              <a:buNone/>
+              <a:defRPr sz="1600"/>
+            </a:lvl5pPr>
+            <a:lvl6pPr marL="2286000" indent="0" algn="ctr">
+              <a:buNone/>
+              <a:defRPr sz="1600"/>
+            </a:lvl6pPr>
+            <a:lvl7pPr marL="2743200" indent="0" algn="ctr">
+              <a:buNone/>
+              <a:defRPr sz="1600"/>
+            </a:lvl7pPr>
+            <a:lvl8pPr marL="3200400" indent="0" algn="ctr">
+              <a:buNone/>
+              <a:defRPr sz="1600"/>
+            </a:lvl8pPr>
+            <a:lvl9pPr marL="3657600" indent="0" algn="ctr">
+              <a:buNone/>
+              <a:defRPr sz="1600"/>
+            </a:lvl9pPr>
+          </a:lstStyle>
+          <a:p>
+            <a:r>
+              <a:rPr lang="en-US"/>
+              <a:t>Click to edit Master subtitle style</a:t>
+            </a:r>
+          </a:p>
+        </p:txBody>
+      </p:sp>
+      <p:sp>
+        <p:nvSpPr>
+          <p:cNvPr id="4" name="Date Placeholder 3">
+            <a:extLst>
+              <a:ext uri="{FF2B5EF4-FFF2-40B4-BE49-F238E27FC236}">
+                <a16:creationId xmlns:a16="http://schemas.microsoft.com/office/drawing/2014/main" id="{4D1AAB0A-656E-0FC1-3206-FDBA85996A5B}"/>
+              </a:ext>
+            </a:extLst>
+          </p:cNvPr>
+          <p:cNvSpPr>
+            <a:spLocks noGrp="1"/>
+          </p:cNvSpPr>
+          <p:nvPr>
+            <p:ph type="dt" idx="10"/>
+          </p:nvPr>
+        </p:nvSpPr>
+        <p:spPr/>
+        <p:txBody>
+          <a:bodyPr/>
+          <a:lstStyle/>
+          <a:p>
+            <a:pPr indent="0" defTabSz="3686760">
+              <a:lnSpc>
+                <a:spcPct val="100000"/>
+              </a:lnSpc>
+              <a:buNone/>
+            </a:pPr>
+            <a:r>
+              <a:rPr lang="en-US" sz="4320" b="0" u="none" strike="noStrike">
+                <a:solidFill>
+                  <a:schemeClr val="dk1">
+                    <a:tint val="75000"/>
+                  </a:schemeClr>
+                </a:solidFill>
+                <a:effectLst/>
+                <a:uFillTx/>
+                <a:latin typeface="Calibri"/>
+              </a:rPr>
+              <a:t>&lt;date/time&gt;</a:t>
+            </a:r>
+            <a:endParaRPr lang="en-US" sz="4320" b="0" u="none" strike="noStrike">
+              <a:solidFill>
+                <a:srgbClr val="000000"/>
+              </a:solidFill>
+              <a:effectLst/>
+              <a:uFillTx/>
+              <a:latin typeface="Times New Roman"/>
+            </a:endParaRPr>
+          </a:p>
+        </p:txBody>
+      </p:sp>
+      <p:sp>
+        <p:nvSpPr>
+          <p:cNvPr id="5" name="Footer Placeholder 4">
+            <a:extLst>
+              <a:ext uri="{FF2B5EF4-FFF2-40B4-BE49-F238E27FC236}">
+                <a16:creationId xmlns:a16="http://schemas.microsoft.com/office/drawing/2014/main" id="{39FC044E-F1B5-94A4-5AE4-6E5F4C371F67}"/>
+              </a:ext>
+            </a:extLst>
+          </p:cNvPr>
+          <p:cNvSpPr>
+            <a:spLocks noGrp="1"/>
+          </p:cNvSpPr>
+          <p:nvPr>
+            <p:ph type="ftr" idx="11"/>
+          </p:nvPr>
+        </p:nvSpPr>
+        <p:spPr/>
+        <p:txBody>
+          <a:bodyPr/>
+          <a:lstStyle/>
+          <a:p>
+            <a:pPr indent="0" algn="ctr">
+              <a:buNone/>
+            </a:pPr>
+            <a:r>
+              <a:rPr lang="en-US" sz="1400" b="0" u="none" strike="noStrike">
+                <a:solidFill>
+                  <a:srgbClr val="000000"/>
+                </a:solidFill>
+                <a:effectLst/>
+                <a:uFillTx/>
+                <a:latin typeface="Times New Roman"/>
+              </a:rPr>
+              <a:t>&lt;footer&gt;</a:t>
+            </a:r>
+          </a:p>
+        </p:txBody>
+      </p:sp>
+      <p:sp>
+        <p:nvSpPr>
+          <p:cNvPr id="6" name="Slide Number Placeholder 5">
+            <a:extLst>
+              <a:ext uri="{FF2B5EF4-FFF2-40B4-BE49-F238E27FC236}">
+                <a16:creationId xmlns:a16="http://schemas.microsoft.com/office/drawing/2014/main" id="{3C8AC693-0812-2B14-550D-E0B4BCFB3DFA}"/>
+              </a:ext>
+            </a:extLst>
+          </p:cNvPr>
+          <p:cNvSpPr>
+            <a:spLocks noGrp="1"/>
+          </p:cNvSpPr>
+          <p:nvPr>
+            <p:ph type="sldNum" idx="12"/>
+          </p:nvPr>
+        </p:nvSpPr>
+        <p:spPr/>
+        <p:txBody>
+          <a:bodyPr/>
+          <a:lstStyle/>
+          <a:p>
+            <a:pPr indent="0" algn="r" defTabSz="3686760">
+              <a:lnSpc>
+                <a:spcPct val="100000"/>
+              </a:lnSpc>
+              <a:buNone/>
+            </a:pPr>
+            <a:fld id="{8F0D49BD-4054-4D7E-9042-7F053818855F}" type="slidenum">
+              <a:rPr lang="en-US" sz="4320" b="0" u="none" strike="noStrike">
+                <a:solidFill>
+                  <a:schemeClr val="dk1">
+                    <a:tint val="75000"/>
+                  </a:schemeClr>
+                </a:solidFill>
+                <a:effectLst/>
+                <a:uFillTx/>
+                <a:latin typeface="Calibri"/>
+              </a:rPr>
+              <a:t>‹#›</a:t>
+            </a:fld>
+            <a:endParaRPr lang="en-US" sz="4320" b="0" u="none" strike="noStrike">
+              <a:solidFill>
+                <a:srgbClr val="000000"/>
+              </a:solidFill>
+              <a:effectLst/>
+              <a:uFillTx/>
+              <a:latin typeface="Times New Roman"/>
+            </a:endParaRPr>
+          </a:p>
+        </p:txBody>
+      </p:sp>
+    </p:spTree>
+    <p:extLst>
+      <p:ext uri="{BB962C8B-B14F-4D97-AF65-F5344CB8AC3E}">
+        <p14:creationId xmlns:p14="http://schemas.microsoft.com/office/powerpoint/2010/main" val="2061058523"/>
+      </p:ext>
+    </p:extLst>
+  </p:cSld>
+  <p:clrMapOvr>
+    <a:masterClrMapping/>
+  </p:clrMapOvr>
+</p:sldLayout>
+</file>
+
+<file path=ppt/slideLayouts/slideLayout11.xml><?xml version="1.0" encoding="utf-8"?>
+<p:sldLayout xmlns:a="http://schemas.openxmlformats.org/drawingml/2006/main" xmlns:r="http://schemas.openxmlformats.org/officeDocument/2006/relationships" xmlns:p="http://schemas.openxmlformats.org/presentationml/2006/main" type="title" preserve="1">
+  <p:cSld name="Title Slide">
+    <p:spTree>
+      <p:nvGrpSpPr>
+        <p:cNvPr id="1" name=""/>
+        <p:cNvGrpSpPr/>
+        <p:nvPr/>
+      </p:nvGrpSpPr>
+      <p:grpSpPr>
+        <a:xfrm>
+          <a:off x="0" y="0"/>
+          <a:ext cx="0" cy="0"/>
+          <a:chOff x="0" y="0"/>
+          <a:chExt cx="0" cy="0"/>
+        </a:xfrm>
+      </p:grpSpPr>
+      <p:sp>
+        <p:nvSpPr>
+          <p:cNvPr id="2" name="Title 1">
+            <a:extLst>
+              <a:ext uri="{FF2B5EF4-FFF2-40B4-BE49-F238E27FC236}">
+                <a16:creationId xmlns:a16="http://schemas.microsoft.com/office/drawing/2014/main" id="{68F9CE2F-AEAD-2EEF-F861-8F6E7C11E48E}"/>
+              </a:ext>
+            </a:extLst>
+          </p:cNvPr>
+          <p:cNvSpPr>
+            <a:spLocks noGrp="1"/>
+          </p:cNvSpPr>
+          <p:nvPr>
+            <p:ph type="ctrTitle"/>
+          </p:nvPr>
+        </p:nvSpPr>
+        <p:spPr>
+          <a:xfrm>
+            <a:off x="4114800" y="7183438"/>
+            <a:ext cx="24688800" cy="15279687"/>
+          </a:xfrm>
+        </p:spPr>
+        <p:txBody>
+          <a:bodyPr anchor="b"/>
+          <a:lstStyle>
+            <a:lvl1pPr algn="ctr">
+              <a:defRPr sz="6000"/>
+            </a:lvl1pPr>
+          </a:lstStyle>
+          <a:p>
+            <a:r>
+              <a:rPr lang="en-US"/>
+              <a:t>Click to edit Master title style</a:t>
+            </a:r>
+          </a:p>
+        </p:txBody>
+      </p:sp>
+      <p:sp>
+        <p:nvSpPr>
+          <p:cNvPr id="3" name="Subtitle 2">
+            <a:extLst>
+              <a:ext uri="{FF2B5EF4-FFF2-40B4-BE49-F238E27FC236}">
+                <a16:creationId xmlns:a16="http://schemas.microsoft.com/office/drawing/2014/main" id="{6A797B72-BA44-0493-9A2B-087153531259}"/>
+              </a:ext>
+            </a:extLst>
+          </p:cNvPr>
+          <p:cNvSpPr>
+            <a:spLocks noGrp="1"/>
+          </p:cNvSpPr>
+          <p:nvPr>
+            <p:ph type="subTitle" idx="1"/>
+          </p:nvPr>
+        </p:nvSpPr>
+        <p:spPr>
+          <a:xfrm>
+            <a:off x="4114800" y="23053675"/>
+            <a:ext cx="24688800" cy="10596563"/>
+          </a:xfrm>
+        </p:spPr>
+        <p:txBody>
+          <a:bodyPr/>
+          <a:lstStyle>
+            <a:lvl1pPr marL="0" indent="0" algn="ctr">
+              <a:buNone/>
+              <a:defRPr sz="2400"/>
+            </a:lvl1pPr>
+            <a:lvl2pPr marL="457200" indent="0" algn="ctr">
+              <a:buNone/>
+              <a:defRPr sz="2000"/>
+            </a:lvl2pPr>
+            <a:lvl3pPr marL="914400" indent="0" algn="ctr">
+              <a:buNone/>
+              <a:defRPr sz="1800"/>
+            </a:lvl3pPr>
+            <a:lvl4pPr marL="1371600" indent="0" algn="ctr">
+              <a:buNone/>
+              <a:defRPr sz="1600"/>
+            </a:lvl4pPr>
+            <a:lvl5pPr marL="1828800" indent="0" algn="ctr">
+              <a:buNone/>
+              <a:defRPr sz="1600"/>
+            </a:lvl5pPr>
+            <a:lvl6pPr marL="2286000" indent="0" algn="ctr">
+              <a:buNone/>
+              <a:defRPr sz="1600"/>
+            </a:lvl6pPr>
+            <a:lvl7pPr marL="2743200" indent="0" algn="ctr">
+              <a:buNone/>
+              <a:defRPr sz="1600"/>
+            </a:lvl7pPr>
+            <a:lvl8pPr marL="3200400" indent="0" algn="ctr">
+              <a:buNone/>
+              <a:defRPr sz="1600"/>
+            </a:lvl8pPr>
+            <a:lvl9pPr marL="3657600" indent="0" algn="ctr">
+              <a:buNone/>
+              <a:defRPr sz="1600"/>
+            </a:lvl9pPr>
+          </a:lstStyle>
+          <a:p>
+            <a:r>
+              <a:rPr lang="en-US"/>
+              <a:t>Click to edit Master subtitle style</a:t>
+            </a:r>
+          </a:p>
+        </p:txBody>
+      </p:sp>
+      <p:sp>
+        <p:nvSpPr>
+          <p:cNvPr id="4" name="Date Placeholder 3">
+            <a:extLst>
+              <a:ext uri="{FF2B5EF4-FFF2-40B4-BE49-F238E27FC236}">
+                <a16:creationId xmlns:a16="http://schemas.microsoft.com/office/drawing/2014/main" id="{C119EA07-9EDD-8796-C145-28371B32CAC7}"/>
+              </a:ext>
+            </a:extLst>
+          </p:cNvPr>
+          <p:cNvSpPr>
+            <a:spLocks noGrp="1"/>
+          </p:cNvSpPr>
+          <p:nvPr>
+            <p:ph type="dt" idx="10"/>
+          </p:nvPr>
+        </p:nvSpPr>
+        <p:spPr/>
+        <p:txBody>
+          <a:bodyPr/>
+          <a:lstStyle/>
+          <a:p>
+            <a:pPr indent="0" defTabSz="3686760">
+              <a:lnSpc>
+                <a:spcPct val="100000"/>
+              </a:lnSpc>
+              <a:buNone/>
+            </a:pPr>
+            <a:r>
+              <a:rPr lang="en-US" sz="4320" b="0" u="none" strike="noStrike">
+                <a:solidFill>
+                  <a:schemeClr val="dk1">
+                    <a:tint val="75000"/>
+                  </a:schemeClr>
+                </a:solidFill>
+                <a:effectLst/>
+                <a:uFillTx/>
+                <a:latin typeface="Calibri"/>
+              </a:rPr>
+              <a:t>&lt;date/time&gt;</a:t>
+            </a:r>
+            <a:endParaRPr lang="en-US" sz="4320" b="0" u="none" strike="noStrike">
+              <a:solidFill>
+                <a:srgbClr val="000000"/>
+              </a:solidFill>
+              <a:effectLst/>
+              <a:uFillTx/>
+              <a:latin typeface="Times New Roman"/>
+            </a:endParaRPr>
+          </a:p>
+        </p:txBody>
+      </p:sp>
+      <p:sp>
+        <p:nvSpPr>
+          <p:cNvPr id="5" name="Footer Placeholder 4">
+            <a:extLst>
+              <a:ext uri="{FF2B5EF4-FFF2-40B4-BE49-F238E27FC236}">
+                <a16:creationId xmlns:a16="http://schemas.microsoft.com/office/drawing/2014/main" id="{7831497D-6E70-C988-6005-BEB620AE89FC}"/>
+              </a:ext>
+            </a:extLst>
+          </p:cNvPr>
+          <p:cNvSpPr>
+            <a:spLocks noGrp="1"/>
+          </p:cNvSpPr>
+          <p:nvPr>
+            <p:ph type="ftr" idx="11"/>
+          </p:nvPr>
+        </p:nvSpPr>
+        <p:spPr/>
+        <p:txBody>
+          <a:bodyPr/>
+          <a:lstStyle/>
+          <a:p>
+            <a:pPr indent="0" algn="ctr">
+              <a:buNone/>
+            </a:pPr>
+            <a:r>
+              <a:rPr lang="en-US" sz="1400" b="0" u="none" strike="noStrike">
+                <a:solidFill>
+                  <a:srgbClr val="000000"/>
+                </a:solidFill>
+                <a:effectLst/>
+                <a:uFillTx/>
+                <a:latin typeface="Times New Roman"/>
+              </a:rPr>
+              <a:t>&lt;footer&gt;</a:t>
+            </a:r>
+          </a:p>
+        </p:txBody>
+      </p:sp>
+      <p:sp>
+        <p:nvSpPr>
+          <p:cNvPr id="6" name="Slide Number Placeholder 5">
+            <a:extLst>
+              <a:ext uri="{FF2B5EF4-FFF2-40B4-BE49-F238E27FC236}">
+                <a16:creationId xmlns:a16="http://schemas.microsoft.com/office/drawing/2014/main" id="{10237A23-055F-8DB1-1B09-6C969D093B9F}"/>
+              </a:ext>
+            </a:extLst>
+          </p:cNvPr>
+          <p:cNvSpPr>
+            <a:spLocks noGrp="1"/>
+          </p:cNvSpPr>
+          <p:nvPr>
+            <p:ph type="sldNum" idx="12"/>
+          </p:nvPr>
+        </p:nvSpPr>
+        <p:spPr/>
+        <p:txBody>
+          <a:bodyPr/>
+          <a:lstStyle/>
+          <a:p>
+            <a:pPr indent="0" algn="r" defTabSz="3686760">
+              <a:lnSpc>
+                <a:spcPct val="100000"/>
+              </a:lnSpc>
+              <a:buNone/>
+            </a:pPr>
+            <a:fld id="{EBEDFE62-D954-482B-91A4-2A576D6FE8FA}" type="slidenum">
+              <a:rPr lang="en-US" sz="4320" b="0" u="none" strike="noStrike">
+                <a:solidFill>
+                  <a:schemeClr val="dk1">
+                    <a:tint val="75000"/>
+                  </a:schemeClr>
+                </a:solidFill>
+                <a:effectLst/>
+                <a:uFillTx/>
+                <a:latin typeface="Calibri"/>
+              </a:rPr>
+              <a:t>‹#›</a:t>
+            </a:fld>
+            <a:endParaRPr lang="en-US" sz="4320" b="0" u="none" strike="noStrike">
+              <a:solidFill>
+                <a:srgbClr val="000000"/>
+              </a:solidFill>
+              <a:effectLst/>
+              <a:uFillTx/>
+              <a:latin typeface="Times New Roman"/>
+            </a:endParaRPr>
+          </a:p>
+        </p:txBody>
+      </p:sp>
+    </p:spTree>
+    <p:extLst>
+      <p:ext uri="{BB962C8B-B14F-4D97-AF65-F5344CB8AC3E}">
+        <p14:creationId xmlns:p14="http://schemas.microsoft.com/office/powerpoint/2010/main" val="2789677311"/>
+      </p:ext>
+    </p:extLst>
+  </p:cSld>
+  <p:clrMapOvr>
+    <a:masterClrMapping/>
+  </p:clrMapOvr>
+</p:sldLayout>
+</file>
+
+<file path=ppt/slideLayouts/slideLayout2.xml><?xml version="1.0" encoding="utf-8"?>
+<p:sldLayout xmlns:a="http://schemas.openxmlformats.org/drawingml/2006/main" xmlns:r="http://schemas.openxmlformats.org/officeDocument/2006/relationships" xmlns:p="http://schemas.openxmlformats.org/presentationml/2006/main" type="title" preserve="1">
+  <p:cSld name="Title Slide">
+    <p:spTree>
+      <p:nvGrpSpPr>
+        <p:cNvPr id="1" name=""/>
+        <p:cNvGrpSpPr/>
+        <p:nvPr/>
+      </p:nvGrpSpPr>
+      <p:grpSpPr>
+        <a:xfrm>
+          <a:off x="0" y="0"/>
+          <a:ext cx="0" cy="0"/>
+          <a:chOff x="0" y="0"/>
+          <a:chExt cx="0" cy="0"/>
+        </a:xfrm>
+      </p:grpSpPr>
+      <p:sp>
+        <p:nvSpPr>
+          <p:cNvPr id="2" name="Title 1">
+            <a:extLst>
+              <a:ext uri="{FF2B5EF4-FFF2-40B4-BE49-F238E27FC236}">
+                <a16:creationId xmlns:a16="http://schemas.microsoft.com/office/drawing/2014/main" id="{DA765ED3-7BDD-C11D-F32E-10F4E3B7E554}"/>
+              </a:ext>
+            </a:extLst>
+          </p:cNvPr>
+          <p:cNvSpPr>
+            <a:spLocks noGrp="1"/>
+          </p:cNvSpPr>
+          <p:nvPr>
+            <p:ph type="ctrTitle"/>
+          </p:nvPr>
+        </p:nvSpPr>
+        <p:spPr>
+          <a:xfrm>
+            <a:off x="4114800" y="7183438"/>
+            <a:ext cx="24688800" cy="15279687"/>
+          </a:xfrm>
+        </p:spPr>
+        <p:txBody>
+          <a:bodyPr anchor="b"/>
+          <a:lstStyle>
+            <a:lvl1pPr algn="ctr">
+              <a:defRPr sz="6000"/>
+            </a:lvl1pPr>
+          </a:lstStyle>
+          <a:p>
+            <a:r>
+              <a:rPr lang="en-US"/>
+              <a:t>Click to edit Master title style</a:t>
+            </a:r>
+          </a:p>
+        </p:txBody>
+      </p:sp>
+      <p:sp>
+        <p:nvSpPr>
+          <p:cNvPr id="3" name="Subtitle 2">
+            <a:extLst>
+              <a:ext uri="{FF2B5EF4-FFF2-40B4-BE49-F238E27FC236}">
+                <a16:creationId xmlns:a16="http://schemas.microsoft.com/office/drawing/2014/main" id="{5EC3B089-0EF0-6CF8-0C2B-24B621CEEDAB}"/>
+              </a:ext>
+            </a:extLst>
+          </p:cNvPr>
+          <p:cNvSpPr>
+            <a:spLocks noGrp="1"/>
+          </p:cNvSpPr>
+          <p:nvPr>
+            <p:ph type="subTitle" idx="1"/>
+          </p:nvPr>
+        </p:nvSpPr>
+        <p:spPr>
+          <a:xfrm>
+            <a:off x="4114800" y="23053675"/>
+            <a:ext cx="24688800" cy="10596563"/>
+          </a:xfrm>
+        </p:spPr>
+        <p:txBody>
+          <a:bodyPr/>
+          <a:lstStyle>
+            <a:lvl1pPr marL="0" indent="0" algn="ctr">
+              <a:buNone/>
+              <a:defRPr sz="2400"/>
+            </a:lvl1pPr>
+            <a:lvl2pPr marL="457200" indent="0" algn="ctr">
+              <a:buNone/>
+              <a:defRPr sz="2000"/>
+            </a:lvl2pPr>
+            <a:lvl3pPr marL="914400" indent="0" algn="ctr">
+              <a:buNone/>
+              <a:defRPr sz="1800"/>
+            </a:lvl3pPr>
+            <a:lvl4pPr marL="1371600" indent="0" algn="ctr">
+              <a:buNone/>
+              <a:defRPr sz="1600"/>
+            </a:lvl4pPr>
+            <a:lvl5pPr marL="1828800" indent="0" algn="ctr">
+              <a:buNone/>
+              <a:defRPr sz="1600"/>
+            </a:lvl5pPr>
+            <a:lvl6pPr marL="2286000" indent="0" algn="ctr">
+              <a:buNone/>
+              <a:defRPr sz="1600"/>
+            </a:lvl6pPr>
+            <a:lvl7pPr marL="2743200" indent="0" algn="ctr">
+              <a:buNone/>
+              <a:defRPr sz="1600"/>
+            </a:lvl7pPr>
+            <a:lvl8pPr marL="3200400" indent="0" algn="ctr">
+              <a:buNone/>
+              <a:defRPr sz="1600"/>
+            </a:lvl8pPr>
+            <a:lvl9pPr marL="3657600" indent="0" algn="ctr">
+              <a:buNone/>
+              <a:defRPr sz="1600"/>
+            </a:lvl9pPr>
+          </a:lstStyle>
+          <a:p>
+            <a:r>
+              <a:rPr lang="en-US"/>
+              <a:t>Click to edit Master subtitle style</a:t>
+            </a:r>
+          </a:p>
+        </p:txBody>
+      </p:sp>
+      <p:sp>
+        <p:nvSpPr>
+          <p:cNvPr id="4" name="Date Placeholder 3">
+            <a:extLst>
+              <a:ext uri="{FF2B5EF4-FFF2-40B4-BE49-F238E27FC236}">
+                <a16:creationId xmlns:a16="http://schemas.microsoft.com/office/drawing/2014/main" id="{0A70843C-B9DD-1D6A-7B7C-00E4C29AB13D}"/>
+              </a:ext>
+            </a:extLst>
+          </p:cNvPr>
+          <p:cNvSpPr>
+            <a:spLocks noGrp="1"/>
+          </p:cNvSpPr>
+          <p:nvPr>
+            <p:ph type="dt" idx="10"/>
+          </p:nvPr>
+        </p:nvSpPr>
+        <p:spPr/>
+        <p:txBody>
+          <a:bodyPr/>
+          <a:lstStyle/>
+          <a:p>
+            <a:pPr indent="0" defTabSz="3686760">
+              <a:lnSpc>
+                <a:spcPct val="100000"/>
+              </a:lnSpc>
+              <a:buNone/>
+            </a:pPr>
+            <a:r>
+              <a:rPr lang="en-US" sz="4320" b="0" u="none" strike="noStrike">
+                <a:solidFill>
+                  <a:schemeClr val="dk1">
+                    <a:tint val="75000"/>
+                  </a:schemeClr>
+                </a:solidFill>
+                <a:effectLst/>
+                <a:uFillTx/>
+                <a:latin typeface="Calibri"/>
+              </a:rPr>
+              <a:t>&lt;date/time&gt;</a:t>
+            </a:r>
+            <a:endParaRPr lang="en-US" sz="4320" b="0" u="none" strike="noStrike">
+              <a:solidFill>
+                <a:srgbClr val="000000"/>
+              </a:solidFill>
+              <a:effectLst/>
+              <a:uFillTx/>
+              <a:latin typeface="Times New Roman"/>
+            </a:endParaRPr>
+          </a:p>
+        </p:txBody>
+      </p:sp>
+      <p:sp>
+        <p:nvSpPr>
+          <p:cNvPr id="5" name="Footer Placeholder 4">
+            <a:extLst>
+              <a:ext uri="{FF2B5EF4-FFF2-40B4-BE49-F238E27FC236}">
+                <a16:creationId xmlns:a16="http://schemas.microsoft.com/office/drawing/2014/main" id="{0AC06C27-A179-9757-8ED8-4BB0EA510945}"/>
+              </a:ext>
+            </a:extLst>
+          </p:cNvPr>
+          <p:cNvSpPr>
+            <a:spLocks noGrp="1"/>
+          </p:cNvSpPr>
+          <p:nvPr>
+            <p:ph type="ftr" idx="11"/>
+          </p:nvPr>
+        </p:nvSpPr>
+        <p:spPr/>
+        <p:txBody>
+          <a:bodyPr/>
+          <a:lstStyle/>
+          <a:p>
+            <a:pPr indent="0" algn="ctr">
+              <a:buNone/>
+            </a:pPr>
+            <a:r>
+              <a:rPr lang="en-US" sz="1400" b="0" u="none" strike="noStrike">
+                <a:solidFill>
+                  <a:srgbClr val="000000"/>
+                </a:solidFill>
+                <a:effectLst/>
+                <a:uFillTx/>
+                <a:latin typeface="Times New Roman"/>
+              </a:rPr>
+              <a:t>&lt;footer&gt;</a:t>
+            </a:r>
+          </a:p>
+        </p:txBody>
+      </p:sp>
+      <p:sp>
+        <p:nvSpPr>
+          <p:cNvPr id="6" name="Slide Number Placeholder 5">
+            <a:extLst>
+              <a:ext uri="{FF2B5EF4-FFF2-40B4-BE49-F238E27FC236}">
+                <a16:creationId xmlns:a16="http://schemas.microsoft.com/office/drawing/2014/main" id="{C54904BE-D4DE-CED9-D1DB-40A6A2AA38FD}"/>
+              </a:ext>
+            </a:extLst>
+          </p:cNvPr>
+          <p:cNvSpPr>
+            <a:spLocks noGrp="1"/>
+          </p:cNvSpPr>
+          <p:nvPr>
+            <p:ph type="sldNum" idx="12"/>
+          </p:nvPr>
+        </p:nvSpPr>
+        <p:spPr/>
+        <p:txBody>
+          <a:bodyPr/>
+          <a:lstStyle/>
+          <a:p>
+            <a:pPr indent="0" algn="r" defTabSz="3686760">
+              <a:lnSpc>
+                <a:spcPct val="100000"/>
+              </a:lnSpc>
+              <a:buNone/>
+            </a:pPr>
+            <a:fld id="{5323C254-255E-4F9A-9B80-950FA50609F0}" type="slidenum">
+              <a:rPr lang="en-US" sz="4320" b="0" u="none" strike="noStrike">
+                <a:solidFill>
+                  <a:schemeClr val="dk1">
+                    <a:tint val="75000"/>
+                  </a:schemeClr>
+                </a:solidFill>
+                <a:effectLst/>
+                <a:uFillTx/>
+                <a:latin typeface="Calibri"/>
+              </a:rPr>
+              <a:t>‹#›</a:t>
+            </a:fld>
+            <a:endParaRPr lang="en-US" sz="4320" b="0" u="none" strike="noStrike">
+              <a:solidFill>
+                <a:srgbClr val="000000"/>
+              </a:solidFill>
+              <a:effectLst/>
+              <a:uFillTx/>
+              <a:latin typeface="Times New Roman"/>
+            </a:endParaRPr>
+          </a:p>
+        </p:txBody>
+      </p:sp>
+    </p:spTree>
+    <p:extLst>
+      <p:ext uri="{BB962C8B-B14F-4D97-AF65-F5344CB8AC3E}">
+        <p14:creationId xmlns:p14="http://schemas.microsoft.com/office/powerpoint/2010/main" val="2138366268"/>
+      </p:ext>
+    </p:extLst>
+  </p:cSld>
+  <p:clrMapOvr>
+    <a:masterClrMapping/>
+  </p:clrMapOvr>
+</p:sldLayout>
+</file>
+
+<file path=ppt/slideLayouts/slideLayout3.xml><?xml version="1.0" encoding="utf-8"?>
+<p:sldLayout xmlns:a="http://schemas.openxmlformats.org/drawingml/2006/main" xmlns:r="http://schemas.openxmlformats.org/officeDocument/2006/relationships" xmlns:p="http://schemas.openxmlformats.org/presentationml/2006/main" type="title" preserve="1">
+  <p:cSld name="Title Slide">
+    <p:spTree>
+      <p:nvGrpSpPr>
+        <p:cNvPr id="1" name=""/>
+        <p:cNvGrpSpPr/>
+        <p:nvPr/>
+      </p:nvGrpSpPr>
+      <p:grpSpPr>
+        <a:xfrm>
+          <a:off x="0" y="0"/>
+          <a:ext cx="0" cy="0"/>
+          <a:chOff x="0" y="0"/>
+          <a:chExt cx="0" cy="0"/>
+        </a:xfrm>
+      </p:grpSpPr>
+      <p:sp>
+        <p:nvSpPr>
+          <p:cNvPr id="2" name="Title 1">
+            <a:extLst>
+              <a:ext uri="{FF2B5EF4-FFF2-40B4-BE49-F238E27FC236}">
+                <a16:creationId xmlns:a16="http://schemas.microsoft.com/office/drawing/2014/main" id="{5ACFBAE8-5D38-4A81-9BE4-2871FCB6EC15}"/>
+              </a:ext>
+            </a:extLst>
+          </p:cNvPr>
+          <p:cNvSpPr>
+            <a:spLocks noGrp="1"/>
+          </p:cNvSpPr>
+          <p:nvPr>
+            <p:ph type="ctrTitle"/>
+          </p:nvPr>
+        </p:nvSpPr>
+        <p:spPr>
+          <a:xfrm>
+            <a:off x="4114800" y="7183438"/>
+            <a:ext cx="24688800" cy="15279687"/>
+          </a:xfrm>
+        </p:spPr>
+        <p:txBody>
+          <a:bodyPr anchor="b"/>
+          <a:lstStyle>
+            <a:lvl1pPr algn="ctr">
+              <a:defRPr sz="6000"/>
+            </a:lvl1pPr>
+          </a:lstStyle>
+          <a:p>
+            <a:r>
+              <a:rPr lang="en-US"/>
+              <a:t>Click to edit Master title style</a:t>
+            </a:r>
+          </a:p>
+        </p:txBody>
+      </p:sp>
+      <p:sp>
+        <p:nvSpPr>
+          <p:cNvPr id="3" name="Subtitle 2">
+            <a:extLst>
+              <a:ext uri="{FF2B5EF4-FFF2-40B4-BE49-F238E27FC236}">
+                <a16:creationId xmlns:a16="http://schemas.microsoft.com/office/drawing/2014/main" id="{12E07DF4-E200-0532-6DEC-F2880DFBFC24}"/>
+              </a:ext>
+            </a:extLst>
+          </p:cNvPr>
+          <p:cNvSpPr>
+            <a:spLocks noGrp="1"/>
+          </p:cNvSpPr>
+          <p:nvPr>
+            <p:ph type="subTitle" idx="1"/>
+          </p:nvPr>
+        </p:nvSpPr>
+        <p:spPr>
+          <a:xfrm>
+            <a:off x="4114800" y="23053675"/>
+            <a:ext cx="24688800" cy="10596563"/>
+          </a:xfrm>
+        </p:spPr>
+        <p:txBody>
+          <a:bodyPr/>
+          <a:lstStyle>
+            <a:lvl1pPr marL="0" indent="0" algn="ctr">
+              <a:buNone/>
+              <a:defRPr sz="2400"/>
+            </a:lvl1pPr>
+            <a:lvl2pPr marL="457200" indent="0" algn="ctr">
+              <a:buNone/>
+              <a:defRPr sz="2000"/>
+            </a:lvl2pPr>
+            <a:lvl3pPr marL="914400" indent="0" algn="ctr">
+              <a:buNone/>
+              <a:defRPr sz="1800"/>
+            </a:lvl3pPr>
+            <a:lvl4pPr marL="1371600" indent="0" algn="ctr">
+              <a:buNone/>
+              <a:defRPr sz="1600"/>
+            </a:lvl4pPr>
+            <a:lvl5pPr marL="1828800" indent="0" algn="ctr">
+              <a:buNone/>
+              <a:defRPr sz="1600"/>
+            </a:lvl5pPr>
+            <a:lvl6pPr marL="2286000" indent="0" algn="ctr">
+              <a:buNone/>
+              <a:defRPr sz="1600"/>
+            </a:lvl6pPr>
+            <a:lvl7pPr marL="2743200" indent="0" algn="ctr">
+              <a:buNone/>
+              <a:defRPr sz="1600"/>
+            </a:lvl7pPr>
+            <a:lvl8pPr marL="3200400" indent="0" algn="ctr">
+              <a:buNone/>
+              <a:defRPr sz="1600"/>
+            </a:lvl8pPr>
+            <a:lvl9pPr marL="3657600" indent="0" algn="ctr">
+              <a:buNone/>
+              <a:defRPr sz="1600"/>
+            </a:lvl9pPr>
+          </a:lstStyle>
+          <a:p>
+            <a:r>
+              <a:rPr lang="en-US"/>
+              <a:t>Click to edit Master subtitle style</a:t>
+            </a:r>
+          </a:p>
+        </p:txBody>
+      </p:sp>
+      <p:sp>
+        <p:nvSpPr>
+          <p:cNvPr id="4" name="Date Placeholder 3">
+            <a:extLst>
+              <a:ext uri="{FF2B5EF4-FFF2-40B4-BE49-F238E27FC236}">
+                <a16:creationId xmlns:a16="http://schemas.microsoft.com/office/drawing/2014/main" id="{119ED651-A1C4-7B21-8BE9-B34C9F092EA0}"/>
+              </a:ext>
+            </a:extLst>
+          </p:cNvPr>
+          <p:cNvSpPr>
+            <a:spLocks noGrp="1"/>
+          </p:cNvSpPr>
+          <p:nvPr>
+            <p:ph type="dt" idx="10"/>
+          </p:nvPr>
+        </p:nvSpPr>
+        <p:spPr/>
+        <p:txBody>
+          <a:bodyPr/>
+          <a:lstStyle/>
+          <a:p>
+            <a:pPr indent="0" defTabSz="3686760">
+              <a:lnSpc>
+                <a:spcPct val="100000"/>
+              </a:lnSpc>
+              <a:buNone/>
+            </a:pPr>
+            <a:r>
+              <a:rPr lang="en-US" sz="4320" b="0" u="none" strike="noStrike">
+                <a:solidFill>
+                  <a:schemeClr val="dk1">
+                    <a:tint val="75000"/>
+                  </a:schemeClr>
+                </a:solidFill>
+                <a:effectLst/>
+                <a:uFillTx/>
+                <a:latin typeface="Calibri"/>
+              </a:rPr>
+              <a:t>&lt;date/time&gt;</a:t>
+            </a:r>
+            <a:endParaRPr lang="en-US" sz="4320" b="0" u="none" strike="noStrike">
+              <a:solidFill>
+                <a:srgbClr val="000000"/>
+              </a:solidFill>
+              <a:effectLst/>
+              <a:uFillTx/>
+              <a:latin typeface="Times New Roman"/>
+            </a:endParaRPr>
+          </a:p>
+        </p:txBody>
+      </p:sp>
+      <p:sp>
+        <p:nvSpPr>
+          <p:cNvPr id="5" name="Footer Placeholder 4">
+            <a:extLst>
+              <a:ext uri="{FF2B5EF4-FFF2-40B4-BE49-F238E27FC236}">
+                <a16:creationId xmlns:a16="http://schemas.microsoft.com/office/drawing/2014/main" id="{0E0E4AFC-82AB-4ADB-2702-5CE076DD2EB7}"/>
+              </a:ext>
+            </a:extLst>
+          </p:cNvPr>
+          <p:cNvSpPr>
+            <a:spLocks noGrp="1"/>
+          </p:cNvSpPr>
+          <p:nvPr>
+            <p:ph type="ftr" idx="11"/>
+          </p:nvPr>
+        </p:nvSpPr>
+        <p:spPr/>
+        <p:txBody>
+          <a:bodyPr/>
+          <a:lstStyle/>
+          <a:p>
+            <a:pPr indent="0" algn="ctr">
+              <a:buNone/>
+            </a:pPr>
+            <a:r>
+              <a:rPr lang="en-US" sz="1400" b="0" u="none" strike="noStrike">
+                <a:solidFill>
+                  <a:srgbClr val="000000"/>
+                </a:solidFill>
+                <a:effectLst/>
+                <a:uFillTx/>
+                <a:latin typeface="Times New Roman"/>
+              </a:rPr>
+              <a:t>&lt;footer&gt;</a:t>
+            </a:r>
+          </a:p>
+        </p:txBody>
+      </p:sp>
+      <p:sp>
+        <p:nvSpPr>
+          <p:cNvPr id="6" name="Slide Number Placeholder 5">
+            <a:extLst>
+              <a:ext uri="{FF2B5EF4-FFF2-40B4-BE49-F238E27FC236}">
+                <a16:creationId xmlns:a16="http://schemas.microsoft.com/office/drawing/2014/main" id="{2D8F210D-D3C0-5EF2-04A9-9239C6AB8A0D}"/>
+              </a:ext>
+            </a:extLst>
+          </p:cNvPr>
+          <p:cNvSpPr>
+            <a:spLocks noGrp="1"/>
+          </p:cNvSpPr>
+          <p:nvPr>
+            <p:ph type="sldNum" idx="12"/>
+          </p:nvPr>
+        </p:nvSpPr>
+        <p:spPr/>
+        <p:txBody>
+          <a:bodyPr/>
+          <a:lstStyle/>
+          <a:p>
+            <a:pPr indent="0" algn="r" defTabSz="3686760">
+              <a:lnSpc>
+                <a:spcPct val="100000"/>
+              </a:lnSpc>
+              <a:buNone/>
+            </a:pPr>
+            <a:fld id="{C9444C3B-F4CF-41ED-9F12-446A5467C14E}" type="slidenum">
+              <a:rPr lang="en-US" sz="4320" b="0" u="none" strike="noStrike">
+                <a:solidFill>
+                  <a:schemeClr val="dk1">
+                    <a:tint val="75000"/>
+                  </a:schemeClr>
+                </a:solidFill>
+                <a:effectLst/>
+                <a:uFillTx/>
+                <a:latin typeface="Calibri"/>
+              </a:rPr>
+              <a:t>‹#›</a:t>
+            </a:fld>
+            <a:endParaRPr lang="en-US" sz="4320" b="0" u="none" strike="noStrike">
+              <a:solidFill>
+                <a:srgbClr val="000000"/>
+              </a:solidFill>
+              <a:effectLst/>
+              <a:uFillTx/>
+              <a:latin typeface="Times New Roman"/>
+            </a:endParaRPr>
+          </a:p>
+        </p:txBody>
+      </p:sp>
+    </p:spTree>
+    <p:extLst>
+      <p:ext uri="{BB962C8B-B14F-4D97-AF65-F5344CB8AC3E}">
+        <p14:creationId xmlns:p14="http://schemas.microsoft.com/office/powerpoint/2010/main" val="3273081049"/>
+      </p:ext>
+    </p:extLst>
+  </p:cSld>
+  <p:clrMapOvr>
+    <a:masterClrMapping/>
+  </p:clrMapOvr>
+</p:sldLayout>
+</file>
+
+<file path=ppt/slideLayouts/slideLayout4.xml><?xml version="1.0" encoding="utf-8"?>
+<p:sldLayout xmlns:a="http://schemas.openxmlformats.org/drawingml/2006/main" xmlns:r="http://schemas.openxmlformats.org/officeDocument/2006/relationships" xmlns:p="http://schemas.openxmlformats.org/presentationml/2006/main" type="title" preserve="1">
+  <p:cSld name="Title Slide">
+    <p:spTree>
+      <p:nvGrpSpPr>
+        <p:cNvPr id="1" name=""/>
+        <p:cNvGrpSpPr/>
+        <p:nvPr/>
+      </p:nvGrpSpPr>
+      <p:grpSpPr>
+        <a:xfrm>
+          <a:off x="0" y="0"/>
+          <a:ext cx="0" cy="0"/>
+          <a:chOff x="0" y="0"/>
+          <a:chExt cx="0" cy="0"/>
+        </a:xfrm>
+      </p:grpSpPr>
+      <p:sp>
+        <p:nvSpPr>
+          <p:cNvPr id="2" name="Title 1">
+            <a:extLst>
+              <a:ext uri="{FF2B5EF4-FFF2-40B4-BE49-F238E27FC236}">
+                <a16:creationId xmlns:a16="http://schemas.microsoft.com/office/drawing/2014/main" id="{0C6155B0-8673-26CA-734F-C10F548EBF8D}"/>
+              </a:ext>
+            </a:extLst>
+          </p:cNvPr>
+          <p:cNvSpPr>
+            <a:spLocks noGrp="1"/>
+          </p:cNvSpPr>
+          <p:nvPr>
+            <p:ph type="ctrTitle"/>
+          </p:nvPr>
+        </p:nvSpPr>
+        <p:spPr>
+          <a:xfrm>
+            <a:off x="4114800" y="7183438"/>
+            <a:ext cx="24688800" cy="15279687"/>
+          </a:xfrm>
+        </p:spPr>
+        <p:txBody>
+          <a:bodyPr anchor="b"/>
+          <a:lstStyle>
+            <a:lvl1pPr algn="ctr">
+              <a:defRPr sz="6000"/>
+            </a:lvl1pPr>
+          </a:lstStyle>
+          <a:p>
+            <a:r>
+              <a:rPr lang="en-US"/>
+              <a:t>Click to edit Master title style</a:t>
+            </a:r>
+          </a:p>
+        </p:txBody>
+      </p:sp>
+      <p:sp>
+        <p:nvSpPr>
+          <p:cNvPr id="3" name="Subtitle 2">
+            <a:extLst>
+              <a:ext uri="{FF2B5EF4-FFF2-40B4-BE49-F238E27FC236}">
+                <a16:creationId xmlns:a16="http://schemas.microsoft.com/office/drawing/2014/main" id="{3F00D50F-5228-1FC0-C69F-7630FEFB3E35}"/>
+              </a:ext>
+            </a:extLst>
+          </p:cNvPr>
+          <p:cNvSpPr>
+            <a:spLocks noGrp="1"/>
+          </p:cNvSpPr>
+          <p:nvPr>
+            <p:ph type="subTitle" idx="1"/>
+          </p:nvPr>
+        </p:nvSpPr>
+        <p:spPr>
+          <a:xfrm>
+            <a:off x="4114800" y="23053675"/>
+            <a:ext cx="24688800" cy="10596563"/>
+          </a:xfrm>
+        </p:spPr>
+        <p:txBody>
+          <a:bodyPr/>
+          <a:lstStyle>
+            <a:lvl1pPr marL="0" indent="0" algn="ctr">
+              <a:buNone/>
+              <a:defRPr sz="2400"/>
+            </a:lvl1pPr>
+            <a:lvl2pPr marL="457200" indent="0" algn="ctr">
+              <a:buNone/>
+              <a:defRPr sz="2000"/>
+            </a:lvl2pPr>
+            <a:lvl3pPr marL="914400" indent="0" algn="ctr">
+              <a:buNone/>
+              <a:defRPr sz="1800"/>
+            </a:lvl3pPr>
+            <a:lvl4pPr marL="1371600" indent="0" algn="ctr">
+              <a:buNone/>
+              <a:defRPr sz="1600"/>
+            </a:lvl4pPr>
+            <a:lvl5pPr marL="1828800" indent="0" algn="ctr">
+              <a:buNone/>
+              <a:defRPr sz="1600"/>
+            </a:lvl5pPr>
+            <a:lvl6pPr marL="2286000" indent="0" algn="ctr">
+              <a:buNone/>
+              <a:defRPr sz="1600"/>
+            </a:lvl6pPr>
+            <a:lvl7pPr marL="2743200" indent="0" algn="ctr">
+              <a:buNone/>
+              <a:defRPr sz="1600"/>
+            </a:lvl7pPr>
+            <a:lvl8pPr marL="3200400" indent="0" algn="ctr">
+              <a:buNone/>
+              <a:defRPr sz="1600"/>
+            </a:lvl8pPr>
+            <a:lvl9pPr marL="3657600" indent="0" algn="ctr">
+              <a:buNone/>
+              <a:defRPr sz="1600"/>
+            </a:lvl9pPr>
+          </a:lstStyle>
+          <a:p>
+            <a:r>
+              <a:rPr lang="en-US"/>
+              <a:t>Click to edit Master subtitle style</a:t>
+            </a:r>
+          </a:p>
+        </p:txBody>
+      </p:sp>
+      <p:sp>
+        <p:nvSpPr>
+          <p:cNvPr id="4" name="Date Placeholder 3">
+            <a:extLst>
+              <a:ext uri="{FF2B5EF4-FFF2-40B4-BE49-F238E27FC236}">
+                <a16:creationId xmlns:a16="http://schemas.microsoft.com/office/drawing/2014/main" id="{25F997BB-2730-1E39-C0E7-8604D8E69534}"/>
+              </a:ext>
+            </a:extLst>
+          </p:cNvPr>
+          <p:cNvSpPr>
+            <a:spLocks noGrp="1"/>
+          </p:cNvSpPr>
+          <p:nvPr>
+            <p:ph type="dt" idx="10"/>
+          </p:nvPr>
+        </p:nvSpPr>
+        <p:spPr/>
+        <p:txBody>
+          <a:bodyPr/>
+          <a:lstStyle/>
+          <a:p>
+            <a:pPr indent="0" defTabSz="3686760">
+              <a:lnSpc>
+                <a:spcPct val="100000"/>
+              </a:lnSpc>
+              <a:buNone/>
+            </a:pPr>
+            <a:r>
+              <a:rPr lang="en-US" sz="4320" b="0" u="none" strike="noStrike">
+                <a:solidFill>
+                  <a:schemeClr val="dk1">
+                    <a:tint val="75000"/>
+                  </a:schemeClr>
+                </a:solidFill>
+                <a:effectLst/>
+                <a:uFillTx/>
+                <a:latin typeface="Calibri"/>
+              </a:rPr>
+              <a:t>&lt;date/time&gt;</a:t>
+            </a:r>
+            <a:endParaRPr lang="en-US" sz="4320" b="0" u="none" strike="noStrike">
+              <a:solidFill>
+                <a:srgbClr val="000000"/>
+              </a:solidFill>
+              <a:effectLst/>
+              <a:uFillTx/>
+              <a:latin typeface="Times New Roman"/>
+            </a:endParaRPr>
+          </a:p>
+        </p:txBody>
+      </p:sp>
+      <p:sp>
+        <p:nvSpPr>
+          <p:cNvPr id="5" name="Footer Placeholder 4">
+            <a:extLst>
+              <a:ext uri="{FF2B5EF4-FFF2-40B4-BE49-F238E27FC236}">
+                <a16:creationId xmlns:a16="http://schemas.microsoft.com/office/drawing/2014/main" id="{58C802BF-A3E4-5C91-414B-FAF3718C56F3}"/>
+              </a:ext>
+            </a:extLst>
+          </p:cNvPr>
+          <p:cNvSpPr>
+            <a:spLocks noGrp="1"/>
+          </p:cNvSpPr>
+          <p:nvPr>
+            <p:ph type="ftr" idx="11"/>
+          </p:nvPr>
+        </p:nvSpPr>
+        <p:spPr/>
+        <p:txBody>
+          <a:bodyPr/>
+          <a:lstStyle/>
+          <a:p>
+            <a:pPr indent="0" algn="ctr">
+              <a:buNone/>
+            </a:pPr>
+            <a:r>
+              <a:rPr lang="en-US" sz="1400" b="0" u="none" strike="noStrike">
+                <a:solidFill>
+                  <a:srgbClr val="000000"/>
+                </a:solidFill>
+                <a:effectLst/>
+                <a:uFillTx/>
+                <a:latin typeface="Times New Roman"/>
+              </a:rPr>
+              <a:t>&lt;footer&gt;</a:t>
+            </a:r>
+          </a:p>
+        </p:txBody>
+      </p:sp>
+      <p:sp>
+        <p:nvSpPr>
+          <p:cNvPr id="6" name="Slide Number Placeholder 5">
+            <a:extLst>
+              <a:ext uri="{FF2B5EF4-FFF2-40B4-BE49-F238E27FC236}">
+                <a16:creationId xmlns:a16="http://schemas.microsoft.com/office/drawing/2014/main" id="{F9FD9D77-2E3B-67C6-A4D4-E616437C58CA}"/>
+              </a:ext>
+            </a:extLst>
+          </p:cNvPr>
+          <p:cNvSpPr>
+            <a:spLocks noGrp="1"/>
+          </p:cNvSpPr>
+          <p:nvPr>
+            <p:ph type="sldNum" idx="12"/>
+          </p:nvPr>
+        </p:nvSpPr>
+        <p:spPr/>
+        <p:txBody>
+          <a:bodyPr/>
+          <a:lstStyle/>
+          <a:p>
+            <a:pPr indent="0" algn="r" defTabSz="3686760">
+              <a:lnSpc>
+                <a:spcPct val="100000"/>
+              </a:lnSpc>
+              <a:buNone/>
+            </a:pPr>
+            <a:fld id="{344610C0-B15E-4ED2-BCBB-C0AAA3AE3B78}" type="slidenum">
+              <a:rPr lang="en-US" sz="4320" b="0" u="none" strike="noStrike">
+                <a:solidFill>
+                  <a:schemeClr val="dk1">
+                    <a:tint val="75000"/>
+                  </a:schemeClr>
+                </a:solidFill>
+                <a:effectLst/>
+                <a:uFillTx/>
+                <a:latin typeface="Calibri"/>
+              </a:rPr>
+              <a:t>‹#›</a:t>
+            </a:fld>
+            <a:endParaRPr lang="en-US" sz="4320" b="0" u="none" strike="noStrike">
+              <a:solidFill>
+                <a:srgbClr val="000000"/>
+              </a:solidFill>
+              <a:effectLst/>
+              <a:uFillTx/>
+              <a:latin typeface="Times New Roman"/>
+            </a:endParaRPr>
+          </a:p>
+        </p:txBody>
+      </p:sp>
+    </p:spTree>
+    <p:extLst>
+      <p:ext uri="{BB962C8B-B14F-4D97-AF65-F5344CB8AC3E}">
+        <p14:creationId xmlns:p14="http://schemas.microsoft.com/office/powerpoint/2010/main" val="3587378645"/>
+      </p:ext>
+    </p:extLst>
+  </p:cSld>
+  <p:clrMapOvr>
+    <a:masterClrMapping/>
+  </p:clrMapOvr>
+</p:sldLayout>
+</file>
+
+<file path=ppt/slideLayouts/slideLayout5.xml><?xml version="1.0" encoding="utf-8"?>
+<p:sldLayout xmlns:a="http://schemas.openxmlformats.org/drawingml/2006/main" xmlns:r="http://schemas.openxmlformats.org/officeDocument/2006/relationships" xmlns:p="http://schemas.openxmlformats.org/presentationml/2006/main" type="title" preserve="1">
+  <p:cSld name="Title Slide">
+    <p:spTree>
+      <p:nvGrpSpPr>
+        <p:cNvPr id="1" name=""/>
+        <p:cNvGrpSpPr/>
+        <p:nvPr/>
+      </p:nvGrpSpPr>
+      <p:grpSpPr>
+        <a:xfrm>
+          <a:off x="0" y="0"/>
+          <a:ext cx="0" cy="0"/>
+          <a:chOff x="0" y="0"/>
+          <a:chExt cx="0" cy="0"/>
+        </a:xfrm>
+      </p:grpSpPr>
+      <p:sp>
+        <p:nvSpPr>
+          <p:cNvPr id="2" name="Title 1">
+            <a:extLst>
+              <a:ext uri="{FF2B5EF4-FFF2-40B4-BE49-F238E27FC236}">
+                <a16:creationId xmlns:a16="http://schemas.microsoft.com/office/drawing/2014/main" id="{60074004-CE04-8BB1-350A-6152814BC25B}"/>
+              </a:ext>
+            </a:extLst>
+          </p:cNvPr>
+          <p:cNvSpPr>
+            <a:spLocks noGrp="1"/>
+          </p:cNvSpPr>
+          <p:nvPr>
+            <p:ph type="ctrTitle"/>
+          </p:nvPr>
+        </p:nvSpPr>
+        <p:spPr>
+          <a:xfrm>
+            <a:off x="4114800" y="7183438"/>
+            <a:ext cx="24688800" cy="15279687"/>
+          </a:xfrm>
+        </p:spPr>
+        <p:txBody>
+          <a:bodyPr anchor="b"/>
+          <a:lstStyle>
+            <a:lvl1pPr algn="ctr">
+              <a:defRPr sz="6000"/>
+            </a:lvl1pPr>
+          </a:lstStyle>
+          <a:p>
+            <a:r>
+              <a:rPr lang="en-US"/>
+              <a:t>Click to edit Master title style</a:t>
+            </a:r>
+          </a:p>
+        </p:txBody>
+      </p:sp>
+      <p:sp>
+        <p:nvSpPr>
+          <p:cNvPr id="3" name="Subtitle 2">
+            <a:extLst>
+              <a:ext uri="{FF2B5EF4-FFF2-40B4-BE49-F238E27FC236}">
+                <a16:creationId xmlns:a16="http://schemas.microsoft.com/office/drawing/2014/main" id="{6548E751-9E08-38D1-09FA-286EFD515145}"/>
+              </a:ext>
+            </a:extLst>
+          </p:cNvPr>
+          <p:cNvSpPr>
+            <a:spLocks noGrp="1"/>
+          </p:cNvSpPr>
+          <p:nvPr>
+            <p:ph type="subTitle" idx="1"/>
+          </p:nvPr>
+        </p:nvSpPr>
+        <p:spPr>
+          <a:xfrm>
+            <a:off x="4114800" y="23053675"/>
+            <a:ext cx="24688800" cy="10596563"/>
+          </a:xfrm>
+        </p:spPr>
+        <p:txBody>
+          <a:bodyPr/>
+          <a:lstStyle>
+            <a:lvl1pPr marL="0" indent="0" algn="ctr">
+              <a:buNone/>
+              <a:defRPr sz="2400"/>
+            </a:lvl1pPr>
+            <a:lvl2pPr marL="457200" indent="0" algn="ctr">
+              <a:buNone/>
+              <a:defRPr sz="2000"/>
+            </a:lvl2pPr>
+            <a:lvl3pPr marL="914400" indent="0" algn="ctr">
+              <a:buNone/>
+              <a:defRPr sz="1800"/>
+            </a:lvl3pPr>
+            <a:lvl4pPr marL="1371600" indent="0" algn="ctr">
+              <a:buNone/>
+              <a:defRPr sz="1600"/>
+            </a:lvl4pPr>
+            <a:lvl5pPr marL="1828800" indent="0" algn="ctr">
+              <a:buNone/>
+              <a:defRPr sz="1600"/>
+            </a:lvl5pPr>
+            <a:lvl6pPr marL="2286000" indent="0" algn="ctr">
+              <a:buNone/>
+              <a:defRPr sz="1600"/>
+            </a:lvl6pPr>
+            <a:lvl7pPr marL="2743200" indent="0" algn="ctr">
+              <a:buNone/>
+              <a:defRPr sz="1600"/>
+            </a:lvl7pPr>
+            <a:lvl8pPr marL="3200400" indent="0" algn="ctr">
+              <a:buNone/>
+              <a:defRPr sz="1600"/>
+            </a:lvl8pPr>
+            <a:lvl9pPr marL="3657600" indent="0" algn="ctr">
+              <a:buNone/>
+              <a:defRPr sz="1600"/>
+            </a:lvl9pPr>
+          </a:lstStyle>
+          <a:p>
+            <a:r>
+              <a:rPr lang="en-US"/>
+              <a:t>Click to edit Master subtitle style</a:t>
+            </a:r>
+          </a:p>
+        </p:txBody>
+      </p:sp>
+      <p:sp>
+        <p:nvSpPr>
+          <p:cNvPr id="4" name="Date Placeholder 3">
+            <a:extLst>
+              <a:ext uri="{FF2B5EF4-FFF2-40B4-BE49-F238E27FC236}">
+                <a16:creationId xmlns:a16="http://schemas.microsoft.com/office/drawing/2014/main" id="{FB1AD264-2542-A994-05A4-8CA063A4D8EB}"/>
+              </a:ext>
+            </a:extLst>
+          </p:cNvPr>
+          <p:cNvSpPr>
+            <a:spLocks noGrp="1"/>
+          </p:cNvSpPr>
+          <p:nvPr>
+            <p:ph type="dt" idx="10"/>
+          </p:nvPr>
+        </p:nvSpPr>
+        <p:spPr/>
+        <p:txBody>
+          <a:bodyPr/>
+          <a:lstStyle/>
+          <a:p>
+            <a:pPr indent="0" defTabSz="3686760">
+              <a:lnSpc>
+                <a:spcPct val="100000"/>
+              </a:lnSpc>
+              <a:buNone/>
+            </a:pPr>
+            <a:r>
+              <a:rPr lang="en-US" sz="4320" b="0" u="none" strike="noStrike">
+                <a:solidFill>
+                  <a:schemeClr val="dk1">
+                    <a:tint val="75000"/>
+                  </a:schemeClr>
+                </a:solidFill>
+                <a:effectLst/>
+                <a:uFillTx/>
+                <a:latin typeface="Calibri"/>
+              </a:rPr>
+              <a:t>&lt;date/time&gt;</a:t>
+            </a:r>
+            <a:endParaRPr lang="en-US" sz="4320" b="0" u="none" strike="noStrike">
+              <a:solidFill>
+                <a:srgbClr val="000000"/>
+              </a:solidFill>
+              <a:effectLst/>
+              <a:uFillTx/>
+              <a:latin typeface="Times New Roman"/>
+            </a:endParaRPr>
+          </a:p>
+        </p:txBody>
+      </p:sp>
+      <p:sp>
+        <p:nvSpPr>
+          <p:cNvPr id="5" name="Footer Placeholder 4">
+            <a:extLst>
+              <a:ext uri="{FF2B5EF4-FFF2-40B4-BE49-F238E27FC236}">
+                <a16:creationId xmlns:a16="http://schemas.microsoft.com/office/drawing/2014/main" id="{F5338CAF-42B8-3653-9A42-EC8EBC2119E5}"/>
+              </a:ext>
+            </a:extLst>
+          </p:cNvPr>
+          <p:cNvSpPr>
+            <a:spLocks noGrp="1"/>
+          </p:cNvSpPr>
+          <p:nvPr>
+            <p:ph type="ftr" idx="11"/>
+          </p:nvPr>
+        </p:nvSpPr>
+        <p:spPr/>
+        <p:txBody>
+          <a:bodyPr/>
+          <a:lstStyle/>
+          <a:p>
+            <a:pPr indent="0" algn="ctr">
+              <a:buNone/>
+            </a:pPr>
+            <a:r>
+              <a:rPr lang="en-US" sz="1400" b="0" u="none" strike="noStrike">
+                <a:solidFill>
+                  <a:srgbClr val="000000"/>
+                </a:solidFill>
+                <a:effectLst/>
+                <a:uFillTx/>
+                <a:latin typeface="Times New Roman"/>
+              </a:rPr>
+              <a:t>&lt;footer&gt;</a:t>
+            </a:r>
+          </a:p>
+        </p:txBody>
+      </p:sp>
+      <p:sp>
+        <p:nvSpPr>
+          <p:cNvPr id="6" name="Slide Number Placeholder 5">
+            <a:extLst>
+              <a:ext uri="{FF2B5EF4-FFF2-40B4-BE49-F238E27FC236}">
+                <a16:creationId xmlns:a16="http://schemas.microsoft.com/office/drawing/2014/main" id="{32BAB845-B887-4995-9CBB-BA80B3F3C5C5}"/>
+              </a:ext>
+            </a:extLst>
+          </p:cNvPr>
+          <p:cNvSpPr>
+            <a:spLocks noGrp="1"/>
+          </p:cNvSpPr>
+          <p:nvPr>
+            <p:ph type="sldNum" idx="12"/>
+          </p:nvPr>
+        </p:nvSpPr>
+        <p:spPr/>
+        <p:txBody>
+          <a:bodyPr/>
+          <a:lstStyle/>
+          <a:p>
+            <a:pPr indent="0" algn="r" defTabSz="3686760">
+              <a:lnSpc>
+                <a:spcPct val="100000"/>
+              </a:lnSpc>
+              <a:buNone/>
+            </a:pPr>
+            <a:fld id="{D419B8C4-309B-4284-A9B5-7C4AC0BA8AF0}" type="slidenum">
+              <a:rPr lang="en-US" sz="4320" b="0" u="none" strike="noStrike">
+                <a:solidFill>
+                  <a:schemeClr val="dk1">
+                    <a:tint val="75000"/>
+                  </a:schemeClr>
+                </a:solidFill>
+                <a:effectLst/>
+                <a:uFillTx/>
+                <a:latin typeface="Calibri"/>
+              </a:rPr>
+              <a:t>‹#›</a:t>
+            </a:fld>
+            <a:endParaRPr lang="en-US" sz="4320" b="0" u="none" strike="noStrike">
+              <a:solidFill>
+                <a:srgbClr val="000000"/>
+              </a:solidFill>
+              <a:effectLst/>
+              <a:uFillTx/>
+              <a:latin typeface="Times New Roman"/>
+            </a:endParaRPr>
+          </a:p>
+        </p:txBody>
+      </p:sp>
+    </p:spTree>
+    <p:extLst>
+      <p:ext uri="{BB962C8B-B14F-4D97-AF65-F5344CB8AC3E}">
+        <p14:creationId xmlns:p14="http://schemas.microsoft.com/office/powerpoint/2010/main" val="4084265054"/>
+      </p:ext>
+    </p:extLst>
+  </p:cSld>
+  <p:clrMapOvr>
+    <a:masterClrMapping/>
+  </p:clrMapOvr>
+</p:sldLayout>
+</file>
+
+<file path=ppt/slideLayouts/slideLayout6.xml><?xml version="1.0" encoding="utf-8"?>
+<p:sldLayout xmlns:a="http://schemas.openxmlformats.org/drawingml/2006/main" xmlns:r="http://schemas.openxmlformats.org/officeDocument/2006/relationships" xmlns:p="http://schemas.openxmlformats.org/presentationml/2006/main" type="title" preserve="1">
+  <p:cSld name="Title Slide">
+    <p:spTree>
+      <p:nvGrpSpPr>
+        <p:cNvPr id="1" name=""/>
+        <p:cNvGrpSpPr/>
+        <p:nvPr/>
+      </p:nvGrpSpPr>
+      <p:grpSpPr>
+        <a:xfrm>
+          <a:off x="0" y="0"/>
+          <a:ext cx="0" cy="0"/>
+          <a:chOff x="0" y="0"/>
+          <a:chExt cx="0" cy="0"/>
+        </a:xfrm>
+      </p:grpSpPr>
+      <p:sp>
+        <p:nvSpPr>
+          <p:cNvPr id="2" name="Title 1">
+            <a:extLst>
+              <a:ext uri="{FF2B5EF4-FFF2-40B4-BE49-F238E27FC236}">
+                <a16:creationId xmlns:a16="http://schemas.microsoft.com/office/drawing/2014/main" id="{12514EDF-BFFC-681C-6246-442D29B256E4}"/>
+              </a:ext>
+            </a:extLst>
+          </p:cNvPr>
+          <p:cNvSpPr>
+            <a:spLocks noGrp="1"/>
+          </p:cNvSpPr>
+          <p:nvPr>
+            <p:ph type="ctrTitle"/>
+          </p:nvPr>
+        </p:nvSpPr>
+        <p:spPr>
+          <a:xfrm>
+            <a:off x="4114800" y="7183438"/>
+            <a:ext cx="24688800" cy="15279687"/>
+          </a:xfrm>
+        </p:spPr>
+        <p:txBody>
+          <a:bodyPr anchor="b"/>
+          <a:lstStyle>
+            <a:lvl1pPr algn="ctr">
+              <a:defRPr sz="6000"/>
+            </a:lvl1pPr>
+          </a:lstStyle>
+          <a:p>
+            <a:r>
+              <a:rPr lang="en-US"/>
+              <a:t>Click to edit Master title style</a:t>
+            </a:r>
+          </a:p>
+        </p:txBody>
+      </p:sp>
+      <p:sp>
+        <p:nvSpPr>
+          <p:cNvPr id="3" name="Subtitle 2">
+            <a:extLst>
+              <a:ext uri="{FF2B5EF4-FFF2-40B4-BE49-F238E27FC236}">
+                <a16:creationId xmlns:a16="http://schemas.microsoft.com/office/drawing/2014/main" id="{EA8B797C-2046-69CC-C1C4-25991DFA5A41}"/>
+              </a:ext>
+            </a:extLst>
+          </p:cNvPr>
+          <p:cNvSpPr>
+            <a:spLocks noGrp="1"/>
+          </p:cNvSpPr>
+          <p:nvPr>
+            <p:ph type="subTitle" idx="1"/>
+          </p:nvPr>
+        </p:nvSpPr>
+        <p:spPr>
+          <a:xfrm>
+            <a:off x="4114800" y="23053675"/>
+            <a:ext cx="24688800" cy="10596563"/>
+          </a:xfrm>
+        </p:spPr>
+        <p:txBody>
+          <a:bodyPr/>
+          <a:lstStyle>
+            <a:lvl1pPr marL="0" indent="0" algn="ctr">
+              <a:buNone/>
+              <a:defRPr sz="2400"/>
+            </a:lvl1pPr>
+            <a:lvl2pPr marL="457200" indent="0" algn="ctr">
+              <a:buNone/>
+              <a:defRPr sz="2000"/>
+            </a:lvl2pPr>
+            <a:lvl3pPr marL="914400" indent="0" algn="ctr">
+              <a:buNone/>
+              <a:defRPr sz="1800"/>
+            </a:lvl3pPr>
+            <a:lvl4pPr marL="1371600" indent="0" algn="ctr">
+              <a:buNone/>
+              <a:defRPr sz="1600"/>
+            </a:lvl4pPr>
+            <a:lvl5pPr marL="1828800" indent="0" algn="ctr">
+              <a:buNone/>
+              <a:defRPr sz="1600"/>
+            </a:lvl5pPr>
+            <a:lvl6pPr marL="2286000" indent="0" algn="ctr">
+              <a:buNone/>
+              <a:defRPr sz="1600"/>
+            </a:lvl6pPr>
+            <a:lvl7pPr marL="2743200" indent="0" algn="ctr">
+              <a:buNone/>
+              <a:defRPr sz="1600"/>
+            </a:lvl7pPr>
+            <a:lvl8pPr marL="3200400" indent="0" algn="ctr">
+              <a:buNone/>
+              <a:defRPr sz="1600"/>
+            </a:lvl8pPr>
+            <a:lvl9pPr marL="3657600" indent="0" algn="ctr">
+              <a:buNone/>
+              <a:defRPr sz="1600"/>
+            </a:lvl9pPr>
+          </a:lstStyle>
+          <a:p>
+            <a:r>
+              <a:rPr lang="en-US"/>
+              <a:t>Click to edit Master subtitle style</a:t>
+            </a:r>
+          </a:p>
+        </p:txBody>
+      </p:sp>
+      <p:sp>
+        <p:nvSpPr>
+          <p:cNvPr id="4" name="Date Placeholder 3">
+            <a:extLst>
+              <a:ext uri="{FF2B5EF4-FFF2-40B4-BE49-F238E27FC236}">
+                <a16:creationId xmlns:a16="http://schemas.microsoft.com/office/drawing/2014/main" id="{669561F4-F1FC-550E-990D-8742CFE31491}"/>
+              </a:ext>
+            </a:extLst>
+          </p:cNvPr>
+          <p:cNvSpPr>
+            <a:spLocks noGrp="1"/>
+          </p:cNvSpPr>
+          <p:nvPr>
+            <p:ph type="dt" idx="10"/>
+          </p:nvPr>
+        </p:nvSpPr>
+        <p:spPr/>
+        <p:txBody>
+          <a:bodyPr/>
+          <a:lstStyle/>
+          <a:p>
+            <a:pPr indent="0" defTabSz="3686760">
+              <a:lnSpc>
+                <a:spcPct val="100000"/>
+              </a:lnSpc>
+              <a:buNone/>
+            </a:pPr>
+            <a:r>
+              <a:rPr lang="en-US" sz="4320" b="0" u="none" strike="noStrike">
+                <a:solidFill>
+                  <a:schemeClr val="dk1">
+                    <a:tint val="75000"/>
+                  </a:schemeClr>
+                </a:solidFill>
+                <a:effectLst/>
+                <a:uFillTx/>
+                <a:latin typeface="Calibri"/>
+              </a:rPr>
+              <a:t>&lt;date/time&gt;</a:t>
+            </a:r>
+            <a:endParaRPr lang="en-US" sz="4320" b="0" u="none" strike="noStrike">
+              <a:solidFill>
+                <a:srgbClr val="000000"/>
+              </a:solidFill>
+              <a:effectLst/>
+              <a:uFillTx/>
+              <a:latin typeface="Times New Roman"/>
+            </a:endParaRPr>
+          </a:p>
+        </p:txBody>
+      </p:sp>
+      <p:sp>
+        <p:nvSpPr>
+          <p:cNvPr id="5" name="Footer Placeholder 4">
+            <a:extLst>
+              <a:ext uri="{FF2B5EF4-FFF2-40B4-BE49-F238E27FC236}">
+                <a16:creationId xmlns:a16="http://schemas.microsoft.com/office/drawing/2014/main" id="{75DFD07B-BE6B-B05F-F598-B67176317B55}"/>
+              </a:ext>
+            </a:extLst>
+          </p:cNvPr>
+          <p:cNvSpPr>
+            <a:spLocks noGrp="1"/>
+          </p:cNvSpPr>
+          <p:nvPr>
+            <p:ph type="ftr" idx="11"/>
+          </p:nvPr>
+        </p:nvSpPr>
+        <p:spPr/>
+        <p:txBody>
+          <a:bodyPr/>
+          <a:lstStyle/>
+          <a:p>
+            <a:pPr indent="0" algn="ctr">
+              <a:buNone/>
+            </a:pPr>
+            <a:r>
+              <a:rPr lang="en-US" sz="1400" b="0" u="none" strike="noStrike">
+                <a:solidFill>
+                  <a:srgbClr val="000000"/>
+                </a:solidFill>
+                <a:effectLst/>
+                <a:uFillTx/>
+                <a:latin typeface="Times New Roman"/>
+              </a:rPr>
+              <a:t>&lt;footer&gt;</a:t>
+            </a:r>
+          </a:p>
+        </p:txBody>
+      </p:sp>
+      <p:sp>
+        <p:nvSpPr>
+          <p:cNvPr id="6" name="Slide Number Placeholder 5">
+            <a:extLst>
+              <a:ext uri="{FF2B5EF4-FFF2-40B4-BE49-F238E27FC236}">
+                <a16:creationId xmlns:a16="http://schemas.microsoft.com/office/drawing/2014/main" id="{213FD0C8-4F22-2EBC-3A3E-2E24D02AB806}"/>
+              </a:ext>
+            </a:extLst>
+          </p:cNvPr>
+          <p:cNvSpPr>
+            <a:spLocks noGrp="1"/>
+          </p:cNvSpPr>
+          <p:nvPr>
+            <p:ph type="sldNum" idx="12"/>
+          </p:nvPr>
+        </p:nvSpPr>
+        <p:spPr/>
+        <p:txBody>
+          <a:bodyPr/>
+          <a:lstStyle/>
+          <a:p>
+            <a:pPr indent="0" algn="r" defTabSz="3686760">
+              <a:lnSpc>
+                <a:spcPct val="100000"/>
+              </a:lnSpc>
+              <a:buNone/>
+            </a:pPr>
+            <a:fld id="{7FA0A2F1-C865-46D0-8164-9659914DD028}" type="slidenum">
+              <a:rPr lang="en-US" sz="4320" b="0" u="none" strike="noStrike">
+                <a:solidFill>
+                  <a:schemeClr val="dk1">
+                    <a:tint val="75000"/>
+                  </a:schemeClr>
+                </a:solidFill>
+                <a:effectLst/>
+                <a:uFillTx/>
+                <a:latin typeface="Calibri"/>
+              </a:rPr>
+              <a:t>‹#›</a:t>
+            </a:fld>
+            <a:endParaRPr lang="en-US" sz="4320" b="0" u="none" strike="noStrike">
+              <a:solidFill>
+                <a:srgbClr val="000000"/>
+              </a:solidFill>
+              <a:effectLst/>
+              <a:uFillTx/>
+              <a:latin typeface="Times New Roman"/>
+            </a:endParaRPr>
+          </a:p>
+        </p:txBody>
+      </p:sp>
+    </p:spTree>
+    <p:extLst>
+      <p:ext uri="{BB962C8B-B14F-4D97-AF65-F5344CB8AC3E}">
+        <p14:creationId xmlns:p14="http://schemas.microsoft.com/office/powerpoint/2010/main" val="146355701"/>
+      </p:ext>
+    </p:extLst>
+  </p:cSld>
+  <p:clrMapOvr>
+    <a:masterClrMapping/>
+  </p:clrMapOvr>
+</p:sldLayout>
+</file>
+
+<file path=ppt/slideLayouts/slideLayout7.xml><?xml version="1.0" encoding="utf-8"?>
+<p:sldLayout xmlns:a="http://schemas.openxmlformats.org/drawingml/2006/main" xmlns:r="http://schemas.openxmlformats.org/officeDocument/2006/relationships" xmlns:p="http://schemas.openxmlformats.org/presentationml/2006/main" type="title" preserve="1">
+  <p:cSld name="Title Slide">
+    <p:spTree>
+      <p:nvGrpSpPr>
+        <p:cNvPr id="1" name=""/>
+        <p:cNvGrpSpPr/>
+        <p:nvPr/>
+      </p:nvGrpSpPr>
+      <p:grpSpPr>
+        <a:xfrm>
+          <a:off x="0" y="0"/>
+          <a:ext cx="0" cy="0"/>
+          <a:chOff x="0" y="0"/>
+          <a:chExt cx="0" cy="0"/>
+        </a:xfrm>
+      </p:grpSpPr>
+      <p:sp>
+        <p:nvSpPr>
+          <p:cNvPr id="2" name="Title 1">
+            <a:extLst>
+              <a:ext uri="{FF2B5EF4-FFF2-40B4-BE49-F238E27FC236}">
+                <a16:creationId xmlns:a16="http://schemas.microsoft.com/office/drawing/2014/main" id="{4594AA20-7FE3-8ECD-D9B7-4094B5BA1979}"/>
+              </a:ext>
+            </a:extLst>
+          </p:cNvPr>
+          <p:cNvSpPr>
+            <a:spLocks noGrp="1"/>
+          </p:cNvSpPr>
+          <p:nvPr>
+            <p:ph type="ctrTitle"/>
+          </p:nvPr>
+        </p:nvSpPr>
+        <p:spPr>
+          <a:xfrm>
+            <a:off x="4114800" y="7183438"/>
+            <a:ext cx="24688800" cy="15279687"/>
+          </a:xfrm>
+        </p:spPr>
+        <p:txBody>
+          <a:bodyPr anchor="b"/>
+          <a:lstStyle>
+            <a:lvl1pPr algn="ctr">
+              <a:defRPr sz="6000"/>
+            </a:lvl1pPr>
+          </a:lstStyle>
+          <a:p>
+            <a:r>
+              <a:rPr lang="en-US"/>
+              <a:t>Click to edit Master title style</a:t>
+            </a:r>
+          </a:p>
+        </p:txBody>
+      </p:sp>
+      <p:sp>
+        <p:nvSpPr>
+          <p:cNvPr id="3" name="Subtitle 2">
+            <a:extLst>
+              <a:ext uri="{FF2B5EF4-FFF2-40B4-BE49-F238E27FC236}">
+                <a16:creationId xmlns:a16="http://schemas.microsoft.com/office/drawing/2014/main" id="{2A9A496B-661F-8C94-92FE-C361C4DCD2CA}"/>
+              </a:ext>
+            </a:extLst>
+          </p:cNvPr>
+          <p:cNvSpPr>
+            <a:spLocks noGrp="1"/>
+          </p:cNvSpPr>
+          <p:nvPr>
+            <p:ph type="subTitle" idx="1"/>
+          </p:nvPr>
+        </p:nvSpPr>
+        <p:spPr>
+          <a:xfrm>
+            <a:off x="4114800" y="23053675"/>
+            <a:ext cx="24688800" cy="10596563"/>
+          </a:xfrm>
+        </p:spPr>
+        <p:txBody>
+          <a:bodyPr/>
+          <a:lstStyle>
+            <a:lvl1pPr marL="0" indent="0" algn="ctr">
+              <a:buNone/>
+              <a:defRPr sz="2400"/>
+            </a:lvl1pPr>
+            <a:lvl2pPr marL="457200" indent="0" algn="ctr">
+              <a:buNone/>
+              <a:defRPr sz="2000"/>
+            </a:lvl2pPr>
+            <a:lvl3pPr marL="914400" indent="0" algn="ctr">
+              <a:buNone/>
+              <a:defRPr sz="1800"/>
+            </a:lvl3pPr>
+            <a:lvl4pPr marL="1371600" indent="0" algn="ctr">
+              <a:buNone/>
+              <a:defRPr sz="1600"/>
+            </a:lvl4pPr>
+            <a:lvl5pPr marL="1828800" indent="0" algn="ctr">
+              <a:buNone/>
+              <a:defRPr sz="1600"/>
+            </a:lvl5pPr>
+            <a:lvl6pPr marL="2286000" indent="0" algn="ctr">
+              <a:buNone/>
+              <a:defRPr sz="1600"/>
+            </a:lvl6pPr>
+            <a:lvl7pPr marL="2743200" indent="0" algn="ctr">
+              <a:buNone/>
+              <a:defRPr sz="1600"/>
+            </a:lvl7pPr>
+            <a:lvl8pPr marL="3200400" indent="0" algn="ctr">
+              <a:buNone/>
+              <a:defRPr sz="1600"/>
+            </a:lvl8pPr>
+            <a:lvl9pPr marL="3657600" indent="0" algn="ctr">
+              <a:buNone/>
+              <a:defRPr sz="1600"/>
+            </a:lvl9pPr>
+          </a:lstStyle>
+          <a:p>
+            <a:r>
+              <a:rPr lang="en-US"/>
+              <a:t>Click to edit Master subtitle style</a:t>
+            </a:r>
+          </a:p>
+        </p:txBody>
+      </p:sp>
+      <p:sp>
+        <p:nvSpPr>
+          <p:cNvPr id="4" name="Date Placeholder 3">
+            <a:extLst>
+              <a:ext uri="{FF2B5EF4-FFF2-40B4-BE49-F238E27FC236}">
+                <a16:creationId xmlns:a16="http://schemas.microsoft.com/office/drawing/2014/main" id="{22FACA1C-3435-AC4D-A2D7-4341BB23B58E}"/>
+              </a:ext>
+            </a:extLst>
+          </p:cNvPr>
+          <p:cNvSpPr>
+            <a:spLocks noGrp="1"/>
+          </p:cNvSpPr>
+          <p:nvPr>
+            <p:ph type="dt" idx="10"/>
+          </p:nvPr>
+        </p:nvSpPr>
+        <p:spPr/>
+        <p:txBody>
+          <a:bodyPr/>
+          <a:lstStyle/>
+          <a:p>
+            <a:pPr indent="0" defTabSz="3686760">
+              <a:lnSpc>
+                <a:spcPct val="100000"/>
+              </a:lnSpc>
+              <a:buNone/>
+            </a:pPr>
+            <a:r>
+              <a:rPr lang="en-US" sz="4320" b="0" u="none" strike="noStrike">
+                <a:solidFill>
+                  <a:schemeClr val="dk1">
+                    <a:tint val="75000"/>
+                  </a:schemeClr>
+                </a:solidFill>
+                <a:effectLst/>
+                <a:uFillTx/>
+                <a:latin typeface="Calibri"/>
+              </a:rPr>
+              <a:t>&lt;date/time&gt;</a:t>
+            </a:r>
+            <a:endParaRPr lang="en-US" sz="4320" b="0" u="none" strike="noStrike">
+              <a:solidFill>
+                <a:srgbClr val="000000"/>
+              </a:solidFill>
+              <a:effectLst/>
+              <a:uFillTx/>
+              <a:latin typeface="Times New Roman"/>
+            </a:endParaRPr>
+          </a:p>
+        </p:txBody>
+      </p:sp>
+      <p:sp>
+        <p:nvSpPr>
+          <p:cNvPr id="5" name="Footer Placeholder 4">
+            <a:extLst>
+              <a:ext uri="{FF2B5EF4-FFF2-40B4-BE49-F238E27FC236}">
+                <a16:creationId xmlns:a16="http://schemas.microsoft.com/office/drawing/2014/main" id="{9F8091E8-500C-5865-CE93-B92DF420D1BC}"/>
+              </a:ext>
+            </a:extLst>
+          </p:cNvPr>
+          <p:cNvSpPr>
+            <a:spLocks noGrp="1"/>
+          </p:cNvSpPr>
+          <p:nvPr>
+            <p:ph type="ftr" idx="11"/>
+          </p:nvPr>
+        </p:nvSpPr>
+        <p:spPr/>
+        <p:txBody>
+          <a:bodyPr/>
+          <a:lstStyle/>
+          <a:p>
+            <a:pPr indent="0" algn="ctr">
+              <a:buNone/>
+            </a:pPr>
+            <a:r>
+              <a:rPr lang="en-US" sz="1400" b="0" u="none" strike="noStrike">
+                <a:solidFill>
+                  <a:srgbClr val="000000"/>
+                </a:solidFill>
+                <a:effectLst/>
+                <a:uFillTx/>
+                <a:latin typeface="Times New Roman"/>
+              </a:rPr>
+              <a:t>&lt;footer&gt;</a:t>
+            </a:r>
+          </a:p>
+        </p:txBody>
+      </p:sp>
+      <p:sp>
+        <p:nvSpPr>
+          <p:cNvPr id="6" name="Slide Number Placeholder 5">
+            <a:extLst>
+              <a:ext uri="{FF2B5EF4-FFF2-40B4-BE49-F238E27FC236}">
+                <a16:creationId xmlns:a16="http://schemas.microsoft.com/office/drawing/2014/main" id="{824D9836-1489-F47B-56B7-F26A8D05D845}"/>
+              </a:ext>
+            </a:extLst>
+          </p:cNvPr>
+          <p:cNvSpPr>
+            <a:spLocks noGrp="1"/>
+          </p:cNvSpPr>
+          <p:nvPr>
+            <p:ph type="sldNum" idx="12"/>
+          </p:nvPr>
+        </p:nvSpPr>
+        <p:spPr/>
+        <p:txBody>
+          <a:bodyPr/>
+          <a:lstStyle/>
+          <a:p>
+            <a:pPr indent="0" algn="r" defTabSz="3686760">
+              <a:lnSpc>
+                <a:spcPct val="100000"/>
+              </a:lnSpc>
+              <a:buNone/>
+            </a:pPr>
+            <a:fld id="{BF581548-F6BC-4C7E-ABC2-29B1CD527CDB}" type="slidenum">
+              <a:rPr lang="en-US" sz="4320" b="0" u="none" strike="noStrike">
+                <a:solidFill>
+                  <a:schemeClr val="dk1">
+                    <a:tint val="75000"/>
+                  </a:schemeClr>
+                </a:solidFill>
+                <a:effectLst/>
+                <a:uFillTx/>
+                <a:latin typeface="Calibri"/>
+              </a:rPr>
+              <a:t>‹#›</a:t>
+            </a:fld>
+            <a:endParaRPr lang="en-US" sz="4320" b="0" u="none" strike="noStrike">
+              <a:solidFill>
+                <a:srgbClr val="000000"/>
+              </a:solidFill>
+              <a:effectLst/>
+              <a:uFillTx/>
+              <a:latin typeface="Times New Roman"/>
+            </a:endParaRPr>
+          </a:p>
+        </p:txBody>
+      </p:sp>
+    </p:spTree>
+    <p:extLst>
+      <p:ext uri="{BB962C8B-B14F-4D97-AF65-F5344CB8AC3E}">
+        <p14:creationId xmlns:p14="http://schemas.microsoft.com/office/powerpoint/2010/main" val="1294702312"/>
+      </p:ext>
+    </p:extLst>
+  </p:cSld>
+  <p:clrMapOvr>
+    <a:masterClrMapping/>
+  </p:clrMapOvr>
+</p:sldLayout>
+</file>
+
+<file path=ppt/slideLayouts/slideLayout8.xml><?xml version="1.0" encoding="utf-8"?>
+<p:sldLayout xmlns:a="http://schemas.openxmlformats.org/drawingml/2006/main" xmlns:r="http://schemas.openxmlformats.org/officeDocument/2006/relationships" xmlns:p="http://schemas.openxmlformats.org/presentationml/2006/main" type="title" preserve="1">
+  <p:cSld name="Title Slide">
+    <p:spTree>
+      <p:nvGrpSpPr>
+        <p:cNvPr id="1" name=""/>
+        <p:cNvGrpSpPr/>
+        <p:nvPr/>
+      </p:nvGrpSpPr>
+      <p:grpSpPr>
+        <a:xfrm>
+          <a:off x="0" y="0"/>
+          <a:ext cx="0" cy="0"/>
+          <a:chOff x="0" y="0"/>
+          <a:chExt cx="0" cy="0"/>
+        </a:xfrm>
+      </p:grpSpPr>
+      <p:sp>
+        <p:nvSpPr>
+          <p:cNvPr id="2" name="Title 1">
+            <a:extLst>
+              <a:ext uri="{FF2B5EF4-FFF2-40B4-BE49-F238E27FC236}">
+                <a16:creationId xmlns:a16="http://schemas.microsoft.com/office/drawing/2014/main" id="{7538EB40-0C1C-C311-CD0B-E7E13AF9147E}"/>
+              </a:ext>
+            </a:extLst>
+          </p:cNvPr>
+          <p:cNvSpPr>
+            <a:spLocks noGrp="1"/>
+          </p:cNvSpPr>
+          <p:nvPr>
+            <p:ph type="ctrTitle"/>
+          </p:nvPr>
+        </p:nvSpPr>
+        <p:spPr>
+          <a:xfrm>
+            <a:off x="4114800" y="7183438"/>
+            <a:ext cx="24688800" cy="15279687"/>
+          </a:xfrm>
+        </p:spPr>
+        <p:txBody>
+          <a:bodyPr anchor="b"/>
+          <a:lstStyle>
+            <a:lvl1pPr algn="ctr">
+              <a:defRPr sz="6000"/>
+            </a:lvl1pPr>
+          </a:lstStyle>
+          <a:p>
+            <a:r>
+              <a:rPr lang="en-US"/>
+              <a:t>Click to edit Master title style</a:t>
+            </a:r>
+          </a:p>
+        </p:txBody>
+      </p:sp>
+      <p:sp>
+        <p:nvSpPr>
+          <p:cNvPr id="3" name="Subtitle 2">
+            <a:extLst>
+              <a:ext uri="{FF2B5EF4-FFF2-40B4-BE49-F238E27FC236}">
+                <a16:creationId xmlns:a16="http://schemas.microsoft.com/office/drawing/2014/main" id="{897E8220-D6E4-D1F7-2322-C78E4200290A}"/>
+              </a:ext>
+            </a:extLst>
+          </p:cNvPr>
+          <p:cNvSpPr>
+            <a:spLocks noGrp="1"/>
+          </p:cNvSpPr>
+          <p:nvPr>
+            <p:ph type="subTitle" idx="1"/>
+          </p:nvPr>
+        </p:nvSpPr>
+        <p:spPr>
+          <a:xfrm>
+            <a:off x="4114800" y="23053675"/>
+            <a:ext cx="24688800" cy="10596563"/>
+          </a:xfrm>
+          <a:prstGeom prst="rect">
+            <a:avLst/>
+          </a:prstGeom>
+        </p:spPr>
+        <p:txBody>
+          <a:bodyPr/>
+          <a:lstStyle>
+            <a:lvl1pPr marL="0" indent="0" algn="ctr">
+              <a:buNone/>
+              <a:defRPr sz="2400"/>
+            </a:lvl1pPr>
+            <a:lvl2pPr marL="457200" indent="0" algn="ctr">
+              <a:buNone/>
+              <a:defRPr sz="2000"/>
+            </a:lvl2pPr>
+            <a:lvl3pPr marL="914400" indent="0" algn="ctr">
+              <a:buNone/>
+              <a:defRPr sz="1800"/>
+            </a:lvl3pPr>
+            <a:lvl4pPr marL="1371600" indent="0" algn="ctr">
+              <a:buNone/>
+              <a:defRPr sz="1600"/>
+            </a:lvl4pPr>
+            <a:lvl5pPr marL="1828800" indent="0" algn="ctr">
+              <a:buNone/>
+              <a:defRPr sz="1600"/>
+            </a:lvl5pPr>
+            <a:lvl6pPr marL="2286000" indent="0" algn="ctr">
+              <a:buNone/>
+              <a:defRPr sz="1600"/>
+            </a:lvl6pPr>
+            <a:lvl7pPr marL="2743200" indent="0" algn="ctr">
+              <a:buNone/>
+              <a:defRPr sz="1600"/>
+            </a:lvl7pPr>
+            <a:lvl8pPr marL="3200400" indent="0" algn="ctr">
+              <a:buNone/>
+              <a:defRPr sz="1600"/>
+            </a:lvl8pPr>
+            <a:lvl9pPr marL="3657600" indent="0" algn="ctr">
+              <a:buNone/>
+              <a:defRPr sz="1600"/>
+            </a:lvl9pPr>
+          </a:lstStyle>
+          <a:p>
+            <a:r>
+              <a:rPr lang="en-US"/>
+              <a:t>Click to edit Master subtitle style</a:t>
+            </a:r>
+          </a:p>
+        </p:txBody>
+      </p:sp>
+      <p:sp>
+        <p:nvSpPr>
+          <p:cNvPr id="4" name="Date Placeholder 3">
+            <a:extLst>
+              <a:ext uri="{FF2B5EF4-FFF2-40B4-BE49-F238E27FC236}">
+                <a16:creationId xmlns:a16="http://schemas.microsoft.com/office/drawing/2014/main" id="{BDFED2F6-CCC2-0E8E-747B-ED4874ADEDEE}"/>
+              </a:ext>
+            </a:extLst>
+          </p:cNvPr>
+          <p:cNvSpPr>
+            <a:spLocks noGrp="1"/>
+          </p:cNvSpPr>
+          <p:nvPr>
+            <p:ph type="dt" idx="10"/>
+          </p:nvPr>
+        </p:nvSpPr>
+        <p:spPr/>
+        <p:txBody>
+          <a:bodyPr/>
+          <a:lstStyle/>
+          <a:p>
+            <a:pPr indent="0" defTabSz="3686760">
+              <a:lnSpc>
+                <a:spcPct val="100000"/>
+              </a:lnSpc>
+              <a:buNone/>
+            </a:pPr>
+            <a:r>
+              <a:rPr lang="en-US" sz="4320" b="0" u="none" strike="noStrike">
+                <a:solidFill>
+                  <a:schemeClr val="dk1">
+                    <a:tint val="75000"/>
+                  </a:schemeClr>
+                </a:solidFill>
+                <a:effectLst/>
+                <a:uFillTx/>
+                <a:latin typeface="Calibri"/>
+              </a:rPr>
+              <a:t>&lt;date/time&gt;</a:t>
+            </a:r>
+            <a:endParaRPr lang="en-US" sz="4320" b="0" u="none" strike="noStrike">
+              <a:solidFill>
+                <a:srgbClr val="000000"/>
+              </a:solidFill>
+              <a:effectLst/>
+              <a:uFillTx/>
+              <a:latin typeface="Times New Roman"/>
+            </a:endParaRPr>
+          </a:p>
+        </p:txBody>
+      </p:sp>
+      <p:sp>
+        <p:nvSpPr>
+          <p:cNvPr id="5" name="Footer Placeholder 4">
+            <a:extLst>
+              <a:ext uri="{FF2B5EF4-FFF2-40B4-BE49-F238E27FC236}">
+                <a16:creationId xmlns:a16="http://schemas.microsoft.com/office/drawing/2014/main" id="{34441D86-229F-7689-A01A-89B5CAC97466}"/>
+              </a:ext>
+            </a:extLst>
+          </p:cNvPr>
+          <p:cNvSpPr>
+            <a:spLocks noGrp="1"/>
+          </p:cNvSpPr>
+          <p:nvPr>
+            <p:ph type="ftr" idx="11"/>
+          </p:nvPr>
+        </p:nvSpPr>
+        <p:spPr/>
+        <p:txBody>
+          <a:bodyPr/>
+          <a:lstStyle/>
+          <a:p>
+            <a:pPr indent="0" algn="ctr">
+              <a:buNone/>
+            </a:pPr>
+            <a:r>
+              <a:rPr lang="en-US" sz="1400" b="0" u="none" strike="noStrike">
+                <a:solidFill>
+                  <a:srgbClr val="000000"/>
+                </a:solidFill>
+                <a:effectLst/>
+                <a:uFillTx/>
+                <a:latin typeface="Times New Roman"/>
+              </a:rPr>
+              <a:t>&lt;footer&gt;</a:t>
+            </a:r>
+          </a:p>
+        </p:txBody>
+      </p:sp>
+      <p:sp>
+        <p:nvSpPr>
+          <p:cNvPr id="6" name="Slide Number Placeholder 5">
+            <a:extLst>
+              <a:ext uri="{FF2B5EF4-FFF2-40B4-BE49-F238E27FC236}">
+                <a16:creationId xmlns:a16="http://schemas.microsoft.com/office/drawing/2014/main" id="{FEE599B6-E3ED-9190-B4C1-69F80AC83A2F}"/>
+              </a:ext>
+            </a:extLst>
+          </p:cNvPr>
+          <p:cNvSpPr>
+            <a:spLocks noGrp="1"/>
+          </p:cNvSpPr>
+          <p:nvPr>
+            <p:ph type="sldNum" idx="12"/>
+          </p:nvPr>
+        </p:nvSpPr>
+        <p:spPr/>
+        <p:txBody>
+          <a:bodyPr/>
+          <a:lstStyle/>
+          <a:p>
+            <a:pPr indent="0" algn="r" defTabSz="3686760">
+              <a:lnSpc>
+                <a:spcPct val="100000"/>
+              </a:lnSpc>
+              <a:buNone/>
+            </a:pPr>
+            <a:fld id="{0F05AC51-3074-4323-8D78-C52EDF208115}" type="slidenum">
+              <a:rPr lang="en-US" sz="4320" b="0" u="none" strike="noStrike">
+                <a:solidFill>
+                  <a:schemeClr val="dk1">
+                    <a:tint val="75000"/>
+                  </a:schemeClr>
+                </a:solidFill>
+                <a:effectLst/>
+                <a:uFillTx/>
+                <a:latin typeface="Calibri"/>
+              </a:rPr>
+              <a:t>‹#›</a:t>
+            </a:fld>
+            <a:endParaRPr lang="en-US" sz="4320" b="0" u="none" strike="noStrike">
+              <a:solidFill>
+                <a:srgbClr val="000000"/>
+              </a:solidFill>
+              <a:effectLst/>
+              <a:uFillTx/>
+              <a:latin typeface="Times New Roman"/>
+            </a:endParaRPr>
+          </a:p>
+        </p:txBody>
+      </p:sp>
+    </p:spTree>
+    <p:extLst>
+      <p:ext uri="{BB962C8B-B14F-4D97-AF65-F5344CB8AC3E}">
+        <p14:creationId xmlns:p14="http://schemas.microsoft.com/office/powerpoint/2010/main" val="3343445168"/>
+      </p:ext>
+    </p:extLst>
+  </p:cSld>
+  <p:clrMapOvr>
+    <a:masterClrMapping/>
+  </p:clrMapOvr>
+</p:sldLayout>
+</file>
+
+<file path=ppt/slideLayouts/slideLayout9.xml><?xml version="1.0" encoding="utf-8"?>
+<p:sldLayout xmlns:a="http://schemas.openxmlformats.org/drawingml/2006/main" xmlns:r="http://schemas.openxmlformats.org/officeDocument/2006/relationships" xmlns:p="http://schemas.openxmlformats.org/presentationml/2006/main" type="title" preserve="1">
+  <p:cSld name="Title Slide">
+    <p:spTree>
+      <p:nvGrpSpPr>
+        <p:cNvPr id="1" name=""/>
+        <p:cNvGrpSpPr/>
+        <p:nvPr/>
+      </p:nvGrpSpPr>
+      <p:grpSpPr>
+        <a:xfrm>
+          <a:off x="0" y="0"/>
+          <a:ext cx="0" cy="0"/>
+          <a:chOff x="0" y="0"/>
+          <a:chExt cx="0" cy="0"/>
+        </a:xfrm>
+      </p:grpSpPr>
+      <p:sp>
+        <p:nvSpPr>
+          <p:cNvPr id="2" name="Title 1">
+            <a:extLst>
+              <a:ext uri="{FF2B5EF4-FFF2-40B4-BE49-F238E27FC236}">
+                <a16:creationId xmlns:a16="http://schemas.microsoft.com/office/drawing/2014/main" id="{B0C331F1-D707-C1AC-F111-D041793ABDF4}"/>
+              </a:ext>
+            </a:extLst>
+          </p:cNvPr>
+          <p:cNvSpPr>
+            <a:spLocks noGrp="1"/>
+          </p:cNvSpPr>
+          <p:nvPr>
+            <p:ph type="ctrTitle"/>
+          </p:nvPr>
+        </p:nvSpPr>
+        <p:spPr>
+          <a:xfrm>
+            <a:off x="4114800" y="7183438"/>
+            <a:ext cx="24688800" cy="15279687"/>
+          </a:xfrm>
+          <a:prstGeom prst="rect">
+            <a:avLst/>
+          </a:prstGeom>
+        </p:spPr>
+        <p:txBody>
+          <a:bodyPr anchor="b"/>
+          <a:lstStyle>
+            <a:lvl1pPr algn="ctr">
+              <a:defRPr sz="6000"/>
+            </a:lvl1pPr>
+          </a:lstStyle>
+          <a:p>
+            <a:r>
+              <a:rPr lang="en-US"/>
+              <a:t>Click to edit Master title style</a:t>
+            </a:r>
+          </a:p>
+        </p:txBody>
+      </p:sp>
+      <p:sp>
+        <p:nvSpPr>
+          <p:cNvPr id="3" name="Subtitle 2">
+            <a:extLst>
+              <a:ext uri="{FF2B5EF4-FFF2-40B4-BE49-F238E27FC236}">
+                <a16:creationId xmlns:a16="http://schemas.microsoft.com/office/drawing/2014/main" id="{ED5168BF-B743-EA23-65DF-BE43DC96649D}"/>
+              </a:ext>
+            </a:extLst>
+          </p:cNvPr>
+          <p:cNvSpPr>
+            <a:spLocks noGrp="1"/>
+          </p:cNvSpPr>
+          <p:nvPr>
+            <p:ph type="subTitle" idx="1"/>
+          </p:nvPr>
+        </p:nvSpPr>
+        <p:spPr>
+          <a:xfrm>
+            <a:off x="4114800" y="23053675"/>
+            <a:ext cx="24688800" cy="10596563"/>
+          </a:xfrm>
+          <a:prstGeom prst="rect">
+            <a:avLst/>
+          </a:prstGeom>
+        </p:spPr>
+        <p:txBody>
+          <a:bodyPr/>
+          <a:lstStyle>
+            <a:lvl1pPr marL="0" indent="0" algn="ctr">
+              <a:buNone/>
+              <a:defRPr sz="2400"/>
+            </a:lvl1pPr>
+            <a:lvl2pPr marL="457200" indent="0" algn="ctr">
+              <a:buNone/>
+              <a:defRPr sz="2000"/>
+            </a:lvl2pPr>
+            <a:lvl3pPr marL="914400" indent="0" algn="ctr">
+              <a:buNone/>
+              <a:defRPr sz="1800"/>
+            </a:lvl3pPr>
+            <a:lvl4pPr marL="1371600" indent="0" algn="ctr">
+              <a:buNone/>
+              <a:defRPr sz="1600"/>
+            </a:lvl4pPr>
+            <a:lvl5pPr marL="1828800" indent="0" algn="ctr">
+              <a:buNone/>
+              <a:defRPr sz="1600"/>
+            </a:lvl5pPr>
+            <a:lvl6pPr marL="2286000" indent="0" algn="ctr">
+              <a:buNone/>
+              <a:defRPr sz="1600"/>
+            </a:lvl6pPr>
+            <a:lvl7pPr marL="2743200" indent="0" algn="ctr">
+              <a:buNone/>
+              <a:defRPr sz="1600"/>
+            </a:lvl7pPr>
+            <a:lvl8pPr marL="3200400" indent="0" algn="ctr">
+              <a:buNone/>
+              <a:defRPr sz="1600"/>
+            </a:lvl8pPr>
+            <a:lvl9pPr marL="3657600" indent="0" algn="ctr">
+              <a:buNone/>
+              <a:defRPr sz="1600"/>
+            </a:lvl9pPr>
+          </a:lstStyle>
+          <a:p>
+            <a:r>
+              <a:rPr lang="en-US"/>
+              <a:t>Click to edit Master subtitle style</a:t>
+            </a:r>
+          </a:p>
+        </p:txBody>
+      </p:sp>
+      <p:sp>
+        <p:nvSpPr>
+          <p:cNvPr id="4" name="Date Placeholder 3">
+            <a:extLst>
+              <a:ext uri="{FF2B5EF4-FFF2-40B4-BE49-F238E27FC236}">
+                <a16:creationId xmlns:a16="http://schemas.microsoft.com/office/drawing/2014/main" id="{99CC8037-03E4-3B96-1644-482075021876}"/>
+              </a:ext>
+            </a:extLst>
+          </p:cNvPr>
+          <p:cNvSpPr>
+            <a:spLocks noGrp="1"/>
+          </p:cNvSpPr>
+          <p:nvPr>
+            <p:ph type="dt" idx="10"/>
+          </p:nvPr>
+        </p:nvSpPr>
+        <p:spPr/>
+        <p:txBody>
+          <a:bodyPr/>
+          <a:lstStyle/>
+          <a:p>
+            <a:pPr indent="0" defTabSz="3686760">
+              <a:lnSpc>
+                <a:spcPct val="100000"/>
+              </a:lnSpc>
+              <a:buNone/>
+            </a:pPr>
+            <a:r>
+              <a:rPr lang="en-US" sz="4320" b="0" u="none" strike="noStrike">
+                <a:solidFill>
+                  <a:schemeClr val="dk1">
+                    <a:tint val="75000"/>
+                  </a:schemeClr>
+                </a:solidFill>
+                <a:effectLst/>
+                <a:uFillTx/>
+                <a:latin typeface="Calibri"/>
+              </a:rPr>
+              <a:t>&lt;date/time&gt;</a:t>
+            </a:r>
+            <a:endParaRPr lang="en-US" sz="4320" b="0" u="none" strike="noStrike">
+              <a:solidFill>
+                <a:srgbClr val="000000"/>
+              </a:solidFill>
+              <a:effectLst/>
+              <a:uFillTx/>
+              <a:latin typeface="Times New Roman"/>
+            </a:endParaRPr>
+          </a:p>
+        </p:txBody>
+      </p:sp>
+      <p:sp>
+        <p:nvSpPr>
+          <p:cNvPr id="5" name="Footer Placeholder 4">
+            <a:extLst>
+              <a:ext uri="{FF2B5EF4-FFF2-40B4-BE49-F238E27FC236}">
+                <a16:creationId xmlns:a16="http://schemas.microsoft.com/office/drawing/2014/main" id="{83F9E3A1-1384-B438-D2C9-AE8B4504772E}"/>
+              </a:ext>
+            </a:extLst>
+          </p:cNvPr>
+          <p:cNvSpPr>
+            <a:spLocks noGrp="1"/>
+          </p:cNvSpPr>
+          <p:nvPr>
+            <p:ph type="ftr" idx="11"/>
+          </p:nvPr>
+        </p:nvSpPr>
+        <p:spPr/>
+        <p:txBody>
+          <a:bodyPr/>
+          <a:lstStyle/>
+          <a:p>
+            <a:pPr indent="0" algn="ctr">
+              <a:buNone/>
+            </a:pPr>
+            <a:r>
+              <a:rPr lang="en-US" sz="1400" b="0" u="none" strike="noStrike">
+                <a:solidFill>
+                  <a:srgbClr val="000000"/>
+                </a:solidFill>
+                <a:effectLst/>
+                <a:uFillTx/>
+                <a:latin typeface="Times New Roman"/>
+              </a:rPr>
+              <a:t>&lt;footer&gt;</a:t>
+            </a:r>
+          </a:p>
+        </p:txBody>
+      </p:sp>
+      <p:sp>
+        <p:nvSpPr>
+          <p:cNvPr id="6" name="Slide Number Placeholder 5">
+            <a:extLst>
+              <a:ext uri="{FF2B5EF4-FFF2-40B4-BE49-F238E27FC236}">
+                <a16:creationId xmlns:a16="http://schemas.microsoft.com/office/drawing/2014/main" id="{DED868A2-CEF1-A03D-5147-738B84380023}"/>
+              </a:ext>
+            </a:extLst>
+          </p:cNvPr>
+          <p:cNvSpPr>
+            <a:spLocks noGrp="1"/>
+          </p:cNvSpPr>
+          <p:nvPr>
+            <p:ph type="sldNum" idx="12"/>
+          </p:nvPr>
+        </p:nvSpPr>
+        <p:spPr/>
+        <p:txBody>
+          <a:bodyPr/>
+          <a:lstStyle/>
+          <a:p>
+            <a:pPr indent="0" algn="r" defTabSz="3686760">
+              <a:lnSpc>
+                <a:spcPct val="100000"/>
+              </a:lnSpc>
+              <a:buNone/>
+            </a:pPr>
+            <a:fld id="{46A45BA0-370F-40AA-852A-A228D61883BD}" type="slidenum">
+              <a:rPr lang="en-US" sz="4320" b="0" u="none" strike="noStrike">
+                <a:solidFill>
+                  <a:schemeClr val="dk1">
+                    <a:tint val="75000"/>
+                  </a:schemeClr>
+                </a:solidFill>
+                <a:effectLst/>
+                <a:uFillTx/>
+                <a:latin typeface="Calibri"/>
+              </a:rPr>
+              <a:t>‹#›</a:t>
+            </a:fld>
+            <a:endParaRPr lang="en-US" sz="4320" b="0" u="none" strike="noStrike">
+              <a:solidFill>
+                <a:srgbClr val="000000"/>
+              </a:solidFill>
+              <a:effectLst/>
+              <a:uFillTx/>
+              <a:latin typeface="Times New Roman"/>
+            </a:endParaRPr>
+          </a:p>
+        </p:txBody>
+      </p:sp>
+    </p:spTree>
+    <p:extLst>
+      <p:ext uri="{BB962C8B-B14F-4D97-AF65-F5344CB8AC3E}">
+        <p14:creationId xmlns:p14="http://schemas.microsoft.com/office/powerpoint/2010/main" val="3347322542"/>
+      </p:ext>
+    </p:extLst>
   </p:cSld>
   <p:clrMapOvr>
     <a:masterClrMapping/>
@@ -1605,6 +4397,9 @@
     </p:spTree>
   </p:cSld>
   <p:clrMap bg1="lt1" tx1="dk1" bg2="lt2" tx2="dk2" accent1="accent1" accent2="accent2" accent3="accent3" accent4="accent4" accent5="accent5" accent6="accent6" hlink="hlink" folHlink="folHlink"/>
+  <p:sldLayoutIdLst>
+    <p:sldLayoutId id="2147483668" r:id="rId1"/>
+  </p:sldLayoutIdLst>
   <p:txStyles>
     <p:titleStyle>
       <a:lvl1pPr algn="l" defTabSz="914400" rtl="0" eaLnBrk="1" latinLnBrk="0" hangingPunct="1">
@@ -2295,6 +5090,9 @@
     </p:spTree>
   </p:cSld>
   <p:clrMap bg1="lt1" tx1="dk1" bg2="lt2" tx2="dk2" accent1="accent1" accent2="accent2" accent3="accent3" accent4="accent4" accent5="accent5" accent6="accent6" hlink="hlink" folHlink="folHlink"/>
+  <p:sldLayoutIdLst>
+    <p:sldLayoutId id="2147483669" r:id="rId1"/>
+  </p:sldLayoutIdLst>
   <p:txStyles>
     <p:titleStyle>
       <a:lvl1pPr algn="l" defTabSz="914400" rtl="0" eaLnBrk="1" latinLnBrk="0" hangingPunct="1">
@@ -3038,6 +5836,9 @@
     </p:spTree>
   </p:cSld>
   <p:clrMap bg1="lt1" tx1="dk1" bg2="lt2" tx2="dk2" accent1="accent1" accent2="accent2" accent3="accent3" accent4="accent4" accent5="accent5" accent6="accent6" hlink="hlink" folHlink="folHlink"/>
+  <p:sldLayoutIdLst>
+    <p:sldLayoutId id="2147483660" r:id="rId1"/>
+  </p:sldLayoutIdLst>
   <p:txStyles>
     <p:titleStyle>
       <a:lvl1pPr algn="l" defTabSz="914400" rtl="0" eaLnBrk="1" latinLnBrk="0" hangingPunct="1">
@@ -3781,6 +6582,9 @@
     </p:spTree>
   </p:cSld>
   <p:clrMap bg1="lt1" tx1="dk1" bg2="lt2" tx2="dk2" accent1="accent1" accent2="accent2" accent3="accent3" accent4="accent4" accent5="accent5" accent6="accent6" hlink="hlink" folHlink="folHlink"/>
+  <p:sldLayoutIdLst>
+    <p:sldLayoutId id="2147483661" r:id="rId1"/>
+  </p:sldLayoutIdLst>
   <p:txStyles>
     <p:titleStyle>
       <a:lvl1pPr algn="l" defTabSz="914400" rtl="0" eaLnBrk="1" latinLnBrk="0" hangingPunct="1">
@@ -4524,6 +7328,9 @@
     </p:spTree>
   </p:cSld>
   <p:clrMap bg1="lt1" tx1="dk1" bg2="lt2" tx2="dk2" accent1="accent1" accent2="accent2" accent3="accent3" accent4="accent4" accent5="accent5" accent6="accent6" hlink="hlink" folHlink="folHlink"/>
+  <p:sldLayoutIdLst>
+    <p:sldLayoutId id="2147483662" r:id="rId1"/>
+  </p:sldLayoutIdLst>
   <p:txStyles>
     <p:titleStyle>
       <a:lvl1pPr algn="l" defTabSz="914400" rtl="0" eaLnBrk="1" latinLnBrk="0" hangingPunct="1">
@@ -5162,6 +7969,9 @@
     </p:spTree>
   </p:cSld>
   <p:clrMap bg1="lt1" tx1="dk1" bg2="lt2" tx2="dk2" accent1="accent1" accent2="accent2" accent3="accent3" accent4="accent4" accent5="accent5" accent6="accent6" hlink="hlink" folHlink="folHlink"/>
+  <p:sldLayoutIdLst>
+    <p:sldLayoutId id="2147483663" r:id="rId1"/>
+  </p:sldLayoutIdLst>
   <p:txStyles>
     <p:titleStyle>
       <a:lvl1pPr algn="l" defTabSz="914400" rtl="0" eaLnBrk="1" latinLnBrk="0" hangingPunct="1">
@@ -6065,6 +8875,9 @@
     </p:spTree>
   </p:cSld>
   <p:clrMap bg1="lt1" tx1="dk1" bg2="lt2" tx2="dk2" accent1="accent1" accent2="accent2" accent3="accent3" accent4="accent4" accent5="accent5" accent6="accent6" hlink="hlink" folHlink="folHlink"/>
+  <p:sldLayoutIdLst>
+    <p:sldLayoutId id="2147483664" r:id="rId1"/>
+  </p:sldLayoutIdLst>
   <p:txStyles>
     <p:titleStyle>
       <a:lvl1pPr algn="l" defTabSz="914400" rtl="0" eaLnBrk="1" latinLnBrk="0" hangingPunct="1">
@@ -7094,6 +9907,9 @@
     </p:spTree>
   </p:cSld>
   <p:clrMap bg1="lt1" tx1="dk1" bg2="lt2" tx2="dk2" accent1="accent1" accent2="accent2" accent3="accent3" accent4="accent4" accent5="accent5" accent6="accent6" hlink="hlink" folHlink="folHlink"/>
+  <p:sldLayoutIdLst>
+    <p:sldLayoutId id="2147483665" r:id="rId1"/>
+  </p:sldLayoutIdLst>
   <p:txStyles>
     <p:titleStyle>
       <a:lvl1pPr algn="l" defTabSz="914400" rtl="0" eaLnBrk="1" latinLnBrk="0" hangingPunct="1">
@@ -7672,6 +10488,9 @@
     </p:spTree>
   </p:cSld>
   <p:clrMap bg1="lt1" tx1="dk1" bg2="lt2" tx2="dk2" accent1="accent1" accent2="accent2" accent3="accent3" accent4="accent4" accent5="accent5" accent6="accent6" hlink="hlink" folHlink="folHlink"/>
+  <p:sldLayoutIdLst>
+    <p:sldLayoutId id="2147483666" r:id="rId1"/>
+  </p:sldLayoutIdLst>
   <p:txStyles>
     <p:titleStyle>
       <a:lvl1pPr algn="l" defTabSz="914400" rtl="0" eaLnBrk="1" latinLnBrk="0" hangingPunct="1">
@@ -8193,6 +11012,9 @@
     </p:spTree>
   </p:cSld>
   <p:clrMap bg1="lt1" tx1="dk1" bg2="lt2" tx2="dk2" accent1="accent1" accent2="accent2" accent3="accent3" accent4="accent4" accent5="accent5" accent6="accent6" hlink="hlink" folHlink="folHlink"/>
+  <p:sldLayoutIdLst>
+    <p:sldLayoutId id="2147483667" r:id="rId1"/>
+  </p:sldLayoutIdLst>
   <p:txStyles>
     <p:titleStyle>
       <a:lvl1pPr algn="l" defTabSz="914400" rtl="0" eaLnBrk="1" latinLnBrk="0" hangingPunct="1">
@@ -10850,109 +13672,6 @@
           </a:p>
         </p:txBody>
       </p:sp>
-      <p:sp>
-        <p:nvSpPr>
-          <p:cNvPr id="79" name="Rectangle 265">
-            <a:extLst>
-              <a:ext uri="{FF2B5EF4-FFF2-40B4-BE49-F238E27FC236}">
-                <a16:creationId xmlns:a16="http://schemas.microsoft.com/office/drawing/2014/main" id="{2D7BCA7D-3172-884A-DFEC-3C36046CA422}"/>
-              </a:ext>
-            </a:extLst>
-          </p:cNvPr>
-          <p:cNvSpPr/>
-          <p:nvPr/>
-        </p:nvSpPr>
-        <p:spPr>
-          <a:xfrm>
-            <a:off x="29077920" y="1554480"/>
-            <a:ext cx="2923560" cy="2194200"/>
-          </a:xfrm>
-          <a:prstGeom prst="rect">
-            <a:avLst/>
-          </a:prstGeom>
-          <a:blipFill rotWithShape="0">
-            <a:blip r:embed="rId5"/>
-            <a:srcRect/>
-            <a:stretch/>
-          </a:blipFill>
-          <a:ln w="9360">
-            <a:solidFill>
-              <a:srgbClr val="000000"/>
-            </a:solidFill>
-            <a:miter/>
-          </a:ln>
-        </p:spPr>
-        <p:style>
-          <a:lnRef idx="0">
-            <a:scrgbClr r="0" g="0" b="0"/>
-          </a:lnRef>
-          <a:fillRef idx="0">
-            <a:scrgbClr r="0" g="0" b="0"/>
-          </a:fillRef>
-          <a:effectRef idx="0">
-            <a:scrgbClr r="0" g="0" b="0"/>
-          </a:effectRef>
-          <a:fontRef idx="minor"/>
-        </p:style>
-        <p:txBody>
-          <a:bodyPr lIns="83880" tIns="41760" rIns="83880" bIns="41760" anchor="ctr">
-            <a:noAutofit/>
-          </a:bodyPr>
-          <a:lstStyle/>
-          <a:p>
-            <a:pPr algn="ctr" defTabSz="4022640">
-              <a:lnSpc>
-                <a:spcPct val="100000"/>
-              </a:lnSpc>
-            </a:pPr>
-            <a:r>
-              <a:rPr lang="en-US" sz="2000" b="1" u="none" strike="noStrike">
-                <a:solidFill>
-                  <a:schemeClr val="dk1"/>
-                </a:solidFill>
-                <a:effectLst/>
-                <a:uFillTx/>
-                <a:latin typeface="Calibri"/>
-              </a:rPr>
-              <a:t>REPLACE THIS BOX WITH YOUR ORGANIZATION’S</a:t>
-            </a:r>
-            <a:endParaRPr lang="en-US" sz="2000" b="0" u="none" strike="noStrike">
-              <a:solidFill>
-                <a:srgbClr val="000000"/>
-              </a:solidFill>
-              <a:effectLst/>
-              <a:uFillTx/>
-              <a:latin typeface="Arial"/>
-            </a:endParaRPr>
-          </a:p>
-          <a:p>
-            <a:pPr algn="ctr" defTabSz="4022640">
-              <a:lnSpc>
-                <a:spcPct val="100000"/>
-              </a:lnSpc>
-            </a:pPr>
-            <a:r>
-              <a:rPr lang="en-US" sz="2000" b="1" u="none" strike="noStrike">
-                <a:solidFill>
-                  <a:schemeClr val="dk1"/>
-                </a:solidFill>
-                <a:effectLst/>
-                <a:uFillTx/>
-                <a:latin typeface="Calibri"/>
-              </a:rPr>
-              <a:t>HIGH RESOLUTION LOGO</a:t>
-            </a:r>
-            <a:endParaRPr lang="en-US" sz="2000" b="0" u="none" strike="noStrike">
-              <a:solidFill>
-                <a:srgbClr val="000000"/>
-              </a:solidFill>
-              <a:effectLst/>
-              <a:uFillTx/>
-              <a:latin typeface="Arial"/>
-            </a:endParaRPr>
-          </a:p>
-        </p:txBody>
-      </p:sp>
       <p:pic>
         <p:nvPicPr>
           <p:cNvPr id="80" name="Picture 79">
@@ -10966,12 +13685,12 @@
           <p:nvPr/>
         </p:nvPicPr>
         <p:blipFill>
-          <a:blip r:embed="rId6"/>
+          <a:blip r:embed="rId5"/>
           <a:stretch/>
         </p:blipFill>
         <p:spPr>
           <a:xfrm>
-            <a:off x="10903320" y="39866760"/>
+            <a:off x="26842756" y="537935"/>
             <a:ext cx="4206051" cy="4023720"/>
           </a:xfrm>
           <a:prstGeom prst="rect">
@@ -11117,7 +13836,7 @@
           <p:nvPr/>
         </p:nvPicPr>
         <p:blipFill>
-          <a:blip r:embed="rId7"/>
+          <a:blip r:embed="rId6"/>
           <a:stretch/>
         </p:blipFill>
         <p:spPr>
@@ -11849,7 +14568,7 @@
           <p:nvPr/>
         </p:nvPicPr>
         <p:blipFill>
-          <a:blip r:embed="rId8"/>
+          <a:blip r:embed="rId7"/>
           <a:stretch>
             <a:fillRect/>
           </a:stretch>

</xml_diff>